<commit_message>
Revise to complete continuous rv examples
</commit_message>
<xml_diff>
--- a/probability/doc/random_variable_distribution.pptx
+++ b/probability/doc/random_variable_distribution.pptx
@@ -5949,7 +5949,7 @@
         </p:spPr>
         <p:txBody>
           <a:bodyPr>
-            <a:normAutofit fontScale="85000" lnSpcReduction="10000"/>
+            <a:normAutofit fontScale="62500" lnSpcReduction="20000"/>
           </a:bodyPr>
           <a:lstStyle/>
           <a:p>
@@ -5978,7 +5978,50 @@
             </a:r>
             <a:r>
               <a:rPr lang="zh-TW" altLang="en-US" dirty="0" smtClean="0"/>
-              <a:t>之間的值的機率是一樣的</a:t>
+              <a:t>之間的值的機率是一樣</a:t>
+            </a:r>
+            <a:r>
+              <a:rPr lang="zh-TW" altLang="en-US" dirty="0" smtClean="0"/>
+              <a:t>的</a:t>
+            </a:r>
+            <a:endParaRPr lang="en-US" altLang="zh-TW" dirty="0" smtClean="0"/>
+          </a:p>
+          <a:p>
+            <a:pPr lvl="1"/>
+            <a:r>
+              <a:rPr lang="zh-TW" altLang="en-US" dirty="0" smtClean="0"/>
+              <a:t>對應</a:t>
+            </a:r>
+            <a:r>
+              <a:rPr lang="en-US" altLang="zh-TW" dirty="0" smtClean="0"/>
+              <a:t>Lecture note</a:t>
+            </a:r>
+          </a:p>
+          <a:p>
+            <a:pPr lvl="2"/>
+            <a:r>
+              <a:rPr lang="en-US" altLang="zh-TW" dirty="0" smtClean="0">
+                <a:sym typeface="Symbol"/>
+              </a:rPr>
+              <a:t>: </a:t>
+            </a:r>
+            <a:r>
+              <a:rPr lang="en-US" altLang="zh-TW" dirty="0" smtClean="0">
+                <a:sym typeface="Symbol"/>
+              </a:rPr>
+              <a:t>min</a:t>
+            </a:r>
+            <a:endParaRPr lang="en-US" altLang="zh-TW" dirty="0" smtClean="0">
+              <a:sym typeface="Symbol"/>
+            </a:endParaRPr>
+          </a:p>
+          <a:p>
+            <a:pPr lvl="2"/>
+            <a:r>
+              <a:rPr lang="en-US" altLang="zh-TW" dirty="0" smtClean="0">
+                <a:sym typeface="Symbol"/>
+              </a:rPr>
+              <a:t>: max</a:t>
             </a:r>
             <a:endParaRPr lang="en-US" altLang="zh-TW" dirty="0" smtClean="0"/>
           </a:p>
@@ -7758,7 +7801,15 @@
                   <a:srgbClr val="FF0000"/>
                 </a:solidFill>
               </a:rPr>
-              <a:t>微分</a:t>
+              <a:t>積</a:t>
+            </a:r>
+            <a:r>
+              <a:rPr lang="zh-TW" altLang="en-US" dirty="0" smtClean="0">
+                <a:solidFill>
+                  <a:srgbClr val="FF0000"/>
+                </a:solidFill>
+              </a:rPr>
+              <a:t>分</a:t>
             </a:r>
             <a:endParaRPr lang="en-US" dirty="0"/>
           </a:p>
@@ -7791,7 +7842,15 @@
                   <a:srgbClr val="FF0000"/>
                 </a:solidFill>
               </a:rPr>
-              <a:t>積分</a:t>
+              <a:t>微</a:t>
+            </a:r>
+            <a:r>
+              <a:rPr lang="zh-TW" altLang="en-US" dirty="0" smtClean="0">
+                <a:solidFill>
+                  <a:srgbClr val="FF0000"/>
+                </a:solidFill>
+              </a:rPr>
+              <a:t>分</a:t>
             </a:r>
             <a:endParaRPr lang="en-US" dirty="0"/>
           </a:p>
@@ -8052,7 +8111,7 @@
         <p:spPr>
           <a:xfrm>
             <a:off x="457200" y="980729"/>
-            <a:ext cx="8229600" cy="2952327"/>
+            <a:ext cx="8229600" cy="3240359"/>
           </a:xfrm>
         </p:spPr>
         <p:txBody>
@@ -8122,14 +8181,43 @@
             </a:r>
             <a:r>
               <a:rPr lang="zh-TW" altLang="en-US" dirty="0" smtClean="0"/>
-              <a:t>單位時間</a:t>
+              <a:t>單位時</a:t>
+            </a:r>
+            <a:r>
+              <a:rPr lang="zh-TW" altLang="en-US" dirty="0" smtClean="0"/>
+              <a:t>間</a:t>
             </a:r>
             <a:endParaRPr lang="en-US" altLang="zh-TW" dirty="0" smtClean="0"/>
           </a:p>
           <a:p>
+            <a:pPr lvl="1"/>
+            <a:r>
+              <a:rPr lang="zh-TW" altLang="en-US" dirty="0" smtClean="0"/>
+              <a:t>對應</a:t>
+            </a:r>
+            <a:r>
+              <a:rPr lang="en-US" altLang="zh-TW" dirty="0" smtClean="0"/>
+              <a:t>Lecture note</a:t>
+            </a:r>
+          </a:p>
+          <a:p>
+            <a:pPr lvl="2"/>
+            <a:r>
+              <a:rPr lang="en-US" altLang="zh-TW" dirty="0" smtClean="0">
+                <a:sym typeface="Symbol"/>
+              </a:rPr>
+              <a:t>: rate</a:t>
+            </a:r>
+            <a:endParaRPr lang="en-US" altLang="zh-TW" dirty="0" smtClean="0"/>
+          </a:p>
+          <a:p>
             <a:r>
               <a:rPr lang="en-US" dirty="0" smtClean="0"/>
-              <a:t>R function</a:t>
+              <a:t>R </a:t>
+            </a:r>
+            <a:r>
+              <a:rPr lang="en-US" dirty="0" smtClean="0"/>
+              <a:t>function</a:t>
             </a:r>
           </a:p>
           <a:p>
@@ -10148,12 +10236,12 @@
         <p:spPr>
           <a:xfrm>
             <a:off x="457200" y="980729"/>
-            <a:ext cx="8229600" cy="3528391"/>
+            <a:ext cx="8229600" cy="3744415"/>
           </a:xfrm>
         </p:spPr>
         <p:txBody>
           <a:bodyPr>
-            <a:normAutofit fontScale="62500" lnSpcReduction="20000"/>
+            <a:normAutofit fontScale="55000" lnSpcReduction="20000"/>
           </a:bodyPr>
           <a:lstStyle/>
           <a:p>
@@ -10254,7 +10342,88 @@
               <a:rPr lang="zh-TW" altLang="en-US" dirty="0" smtClean="0">
                 <a:sym typeface="Symbol"/>
               </a:rPr>
-              <a:t>單位時間發生次數</a:t>
+              <a:t>單位時間發生次</a:t>
+            </a:r>
+            <a:r>
+              <a:rPr lang="zh-TW" altLang="en-US" dirty="0" smtClean="0">
+                <a:sym typeface="Symbol"/>
+              </a:rPr>
+              <a:t>數</a:t>
+            </a:r>
+            <a:endParaRPr lang="en-US" altLang="zh-TW" dirty="0" smtClean="0">
+              <a:sym typeface="Symbol"/>
+            </a:endParaRPr>
+          </a:p>
+          <a:p>
+            <a:pPr lvl="1"/>
+            <a:r>
+              <a:rPr lang="zh-TW" altLang="en-US" dirty="0" smtClean="0">
+                <a:sym typeface="Symbol"/>
+              </a:rPr>
+              <a:t>當</a:t>
+            </a:r>
+            <a:r>
+              <a:rPr lang="en-US" altLang="zh-TW" dirty="0" smtClean="0">
+                <a:sym typeface="Symbol"/>
+              </a:rPr>
+              <a:t>=n/2</a:t>
+            </a:r>
+            <a:r>
+              <a:rPr lang="zh-TW" altLang="en-US" dirty="0" smtClean="0">
+                <a:sym typeface="Symbol"/>
+              </a:rPr>
+              <a:t>，</a:t>
+            </a:r>
+            <a:r>
+              <a:rPr lang="en-US" altLang="zh-TW" dirty="0" smtClean="0">
+                <a:sym typeface="Symbol"/>
+              </a:rPr>
+              <a:t> </a:t>
+            </a:r>
+            <a:r>
+              <a:rPr lang="en-US" altLang="zh-TW" dirty="0" smtClean="0">
+                <a:sym typeface="Symbol"/>
+              </a:rPr>
+              <a:t>=1/2</a:t>
+            </a:r>
+            <a:r>
+              <a:rPr lang="zh-TW" altLang="en-US" dirty="0" smtClean="0">
+                <a:sym typeface="Symbol"/>
+              </a:rPr>
+              <a:t>，</a:t>
+            </a:r>
+            <a:r>
+              <a:rPr lang="en-US" altLang="zh-TW" dirty="0" smtClean="0">
+                <a:sym typeface="Symbol"/>
+              </a:rPr>
+              <a:t>Gamma</a:t>
+            </a:r>
+            <a:r>
+              <a:rPr lang="zh-TW" altLang="en-US" dirty="0" smtClean="0">
+                <a:sym typeface="Symbol"/>
+              </a:rPr>
+              <a:t>稱為</a:t>
+            </a:r>
+            <a:r>
+              <a:rPr lang="en-US" altLang="zh-TW" dirty="0" smtClean="0">
+                <a:sym typeface="Symbol"/>
+              </a:rPr>
+              <a:t>Chi-squared distribution with n degree of freedom</a:t>
+            </a:r>
+          </a:p>
+          <a:p>
+            <a:pPr lvl="2"/>
+            <a:r>
+              <a:rPr lang="en-US" altLang="zh-TW" dirty="0" smtClean="0">
+                <a:sym typeface="Symbol"/>
+              </a:rPr>
+              <a:t>n</a:t>
+            </a:r>
+            <a:r>
+              <a:rPr lang="zh-TW" altLang="en-US" dirty="0" smtClean="0">
+                <a:sym typeface="Symbol"/>
+              </a:rPr>
+              <a:t>是正整數</a:t>
             </a:r>
             <a:endParaRPr lang="en-US" altLang="zh-TW" dirty="0" smtClean="0"/>
           </a:p>
@@ -10359,7 +10528,7 @@
         </p:blipFill>
         <p:spPr bwMode="auto">
           <a:xfrm>
-            <a:off x="539552" y="4581128"/>
+            <a:off x="539552" y="4800600"/>
             <a:ext cx="4610100" cy="2057400"/>
           </a:xfrm>
           <a:prstGeom prst="rect">
@@ -10379,6 +10548,13 @@
   <p:clrMapOvr>
     <a:masterClrMapping/>
   </p:clrMapOvr>
+  <p:timing>
+    <p:tnLst>
+      <p:par>
+        <p:cTn id="1" dur="indefinite" restart="never" nodeType="tmRoot"/>
+      </p:par>
+    </p:tnLst>
+  </p:timing>
 </p:sld>
 </file>
 
@@ -11227,6 +11403,13 @@
   <p:clrMapOvr>
     <a:masterClrMapping/>
   </p:clrMapOvr>
+  <p:timing>
+    <p:tnLst>
+      <p:par>
+        <p:cTn id="1" dur="indefinite" restart="never" nodeType="tmRoot"/>
+      </p:par>
+    </p:tnLst>
+  </p:timing>
 </p:sld>
 </file>
 
@@ -16382,6 +16565,13 @@
   <p:clrMapOvr>
     <a:masterClrMapping/>
   </p:clrMapOvr>
+  <p:timing>
+    <p:tnLst>
+      <p:par>
+        <p:cTn id="1" dur="indefinite" restart="never" nodeType="tmRoot"/>
+      </p:par>
+    </p:tnLst>
+  </p:timing>
 </p:sld>
 </file>
 
@@ -16697,6 +16887,13 @@
   <p:clrMapOvr>
     <a:masterClrMapping/>
   </p:clrMapOvr>
+  <p:timing>
+    <p:tnLst>
+      <p:par>
+        <p:cTn id="1" dur="indefinite" restart="never" nodeType="tmRoot"/>
+      </p:par>
+    </p:tnLst>
+  </p:timing>
 </p:sld>
 </file>
 

</xml_diff>

<commit_message>
Add cond dist and mgf in PPT
</commit_message>
<xml_diff>
--- a/probability/doc/random_variable_distribution.pptx
+++ b/probability/doc/random_variable_distribution.pptx
@@ -4,6 +4,9 @@
   <p:sldMasterIdLst>
     <p:sldMasterId id="2147483672" r:id="rId1"/>
   </p:sldMasterIdLst>
+  <p:notesMasterIdLst>
+    <p:notesMasterId r:id="rId38"/>
+  </p:notesMasterIdLst>
   <p:sldIdLst>
     <p:sldId id="256" r:id="rId2"/>
     <p:sldId id="259" r:id="rId3"/>
@@ -36,10 +39,11 @@
     <p:sldId id="287" r:id="rId30"/>
     <p:sldId id="288" r:id="rId31"/>
     <p:sldId id="289" r:id="rId32"/>
-    <p:sldId id="277" r:id="rId33"/>
+    <p:sldId id="296" r:id="rId33"/>
     <p:sldId id="292" r:id="rId34"/>
     <p:sldId id="290" r:id="rId35"/>
     <p:sldId id="291" r:id="rId36"/>
+    <p:sldId id="297" r:id="rId37"/>
   </p:sldIdLst>
   <p:sldSz cx="9144000" cy="6858000" type="screen4x3"/>
   <p:notesSz cx="6858000" cy="9144000"/>
@@ -141,6 +145,437 @@
 </p:presentation>
 </file>
 
+<file path=ppt/notesMasters/notesMaster1.xml><?xml version="1.0" encoding="utf-8"?>
+<p:notesMaster xmlns:a="http://schemas.openxmlformats.org/drawingml/2006/main" xmlns:r="http://schemas.openxmlformats.org/officeDocument/2006/relationships" xmlns:p="http://schemas.openxmlformats.org/presentationml/2006/main">
+  <p:cSld>
+    <p:bg>
+      <p:bgRef idx="1001">
+        <a:schemeClr val="bg1"/>
+      </p:bgRef>
+    </p:bg>
+    <p:spTree>
+      <p:nvGrpSpPr>
+        <p:cNvPr id="1" name=""/>
+        <p:cNvGrpSpPr/>
+        <p:nvPr/>
+      </p:nvGrpSpPr>
+      <p:grpSpPr>
+        <a:xfrm>
+          <a:off x="0" y="0"/>
+          <a:ext cx="0" cy="0"/>
+          <a:chOff x="0" y="0"/>
+          <a:chExt cx="0" cy="0"/>
+        </a:xfrm>
+      </p:grpSpPr>
+      <p:sp>
+        <p:nvSpPr>
+          <p:cNvPr id="2" name="Header Placeholder 1"/>
+          <p:cNvSpPr>
+            <a:spLocks noGrp="1"/>
+          </p:cNvSpPr>
+          <p:nvPr>
+            <p:ph type="hdr" sz="quarter"/>
+          </p:nvPr>
+        </p:nvSpPr>
+        <p:spPr>
+          <a:xfrm>
+            <a:off x="0" y="0"/>
+            <a:ext cx="2971800" cy="457200"/>
+          </a:xfrm>
+          <a:prstGeom prst="rect">
+            <a:avLst/>
+          </a:prstGeom>
+        </p:spPr>
+        <p:txBody>
+          <a:bodyPr vert="horz" lIns="91440" tIns="45720" rIns="91440" bIns="45720" rtlCol="0"/>
+          <a:lstStyle>
+            <a:lvl1pPr algn="l">
+              <a:defRPr sz="1200"/>
+            </a:lvl1pPr>
+          </a:lstStyle>
+          <a:p>
+            <a:endParaRPr lang="en-US"/>
+          </a:p>
+        </p:txBody>
+      </p:sp>
+      <p:sp>
+        <p:nvSpPr>
+          <p:cNvPr id="3" name="Date Placeholder 2"/>
+          <p:cNvSpPr>
+            <a:spLocks noGrp="1"/>
+          </p:cNvSpPr>
+          <p:nvPr>
+            <p:ph type="dt" idx="1"/>
+          </p:nvPr>
+        </p:nvSpPr>
+        <p:spPr>
+          <a:xfrm>
+            <a:off x="3884613" y="0"/>
+            <a:ext cx="2971800" cy="457200"/>
+          </a:xfrm>
+          <a:prstGeom prst="rect">
+            <a:avLst/>
+          </a:prstGeom>
+        </p:spPr>
+        <p:txBody>
+          <a:bodyPr vert="horz" lIns="91440" tIns="45720" rIns="91440" bIns="45720" rtlCol="0"/>
+          <a:lstStyle>
+            <a:lvl1pPr algn="r">
+              <a:defRPr sz="1200"/>
+            </a:lvl1pPr>
+          </a:lstStyle>
+          <a:p>
+            <a:fld id="{82806AD6-EF9A-49A4-9710-5F897D136B70}" type="datetimeFigureOut">
+              <a:rPr lang="en-US" smtClean="0"/>
+              <a:pPr/>
+              <a:t>8/16/2016</a:t>
+            </a:fld>
+            <a:endParaRPr lang="en-US"/>
+          </a:p>
+        </p:txBody>
+      </p:sp>
+      <p:sp>
+        <p:nvSpPr>
+          <p:cNvPr id="4" name="Slide Image Placeholder 3"/>
+          <p:cNvSpPr>
+            <a:spLocks noGrp="1" noRot="1" noChangeAspect="1"/>
+          </p:cNvSpPr>
+          <p:nvPr>
+            <p:ph type="sldImg" idx="2"/>
+          </p:nvPr>
+        </p:nvSpPr>
+        <p:spPr>
+          <a:xfrm>
+            <a:off x="1143000" y="685800"/>
+            <a:ext cx="4572000" cy="3429000"/>
+          </a:xfrm>
+          <a:prstGeom prst="rect">
+            <a:avLst/>
+          </a:prstGeom>
+          <a:noFill/>
+          <a:ln w="12700">
+            <a:solidFill>
+              <a:prstClr val="black"/>
+            </a:solidFill>
+          </a:ln>
+        </p:spPr>
+        <p:txBody>
+          <a:bodyPr vert="horz" lIns="91440" tIns="45720" rIns="91440" bIns="45720" rtlCol="0" anchor="ctr"/>
+          <a:lstStyle/>
+          <a:p>
+            <a:endParaRPr lang="en-US"/>
+          </a:p>
+        </p:txBody>
+      </p:sp>
+      <p:sp>
+        <p:nvSpPr>
+          <p:cNvPr id="5" name="Notes Placeholder 4"/>
+          <p:cNvSpPr>
+            <a:spLocks noGrp="1"/>
+          </p:cNvSpPr>
+          <p:nvPr>
+            <p:ph type="body" sz="quarter" idx="3"/>
+          </p:nvPr>
+        </p:nvSpPr>
+        <p:spPr>
+          <a:xfrm>
+            <a:off x="685800" y="4343400"/>
+            <a:ext cx="5486400" cy="4114800"/>
+          </a:xfrm>
+          <a:prstGeom prst="rect">
+            <a:avLst/>
+          </a:prstGeom>
+        </p:spPr>
+        <p:txBody>
+          <a:bodyPr vert="horz" lIns="91440" tIns="45720" rIns="91440" bIns="45720" rtlCol="0">
+            <a:normAutofit/>
+          </a:bodyPr>
+          <a:lstStyle/>
+          <a:p>
+            <a:pPr lvl="0"/>
+            <a:r>
+              <a:rPr lang="en-US" smtClean="0"/>
+              <a:t>Click to edit Master text styles</a:t>
+            </a:r>
+          </a:p>
+          <a:p>
+            <a:pPr lvl="1"/>
+            <a:r>
+              <a:rPr lang="en-US" smtClean="0"/>
+              <a:t>Second level</a:t>
+            </a:r>
+          </a:p>
+          <a:p>
+            <a:pPr lvl="2"/>
+            <a:r>
+              <a:rPr lang="en-US" smtClean="0"/>
+              <a:t>Third level</a:t>
+            </a:r>
+          </a:p>
+          <a:p>
+            <a:pPr lvl="3"/>
+            <a:r>
+              <a:rPr lang="en-US" smtClean="0"/>
+              <a:t>Fourth level</a:t>
+            </a:r>
+          </a:p>
+          <a:p>
+            <a:pPr lvl="4"/>
+            <a:r>
+              <a:rPr lang="en-US" smtClean="0"/>
+              <a:t>Fifth level</a:t>
+            </a:r>
+            <a:endParaRPr lang="en-US"/>
+          </a:p>
+        </p:txBody>
+      </p:sp>
+      <p:sp>
+        <p:nvSpPr>
+          <p:cNvPr id="6" name="Footer Placeholder 5"/>
+          <p:cNvSpPr>
+            <a:spLocks noGrp="1"/>
+          </p:cNvSpPr>
+          <p:nvPr>
+            <p:ph type="ftr" sz="quarter" idx="4"/>
+          </p:nvPr>
+        </p:nvSpPr>
+        <p:spPr>
+          <a:xfrm>
+            <a:off x="0" y="8685213"/>
+            <a:ext cx="2971800" cy="457200"/>
+          </a:xfrm>
+          <a:prstGeom prst="rect">
+            <a:avLst/>
+          </a:prstGeom>
+        </p:spPr>
+        <p:txBody>
+          <a:bodyPr vert="horz" lIns="91440" tIns="45720" rIns="91440" bIns="45720" rtlCol="0" anchor="b"/>
+          <a:lstStyle>
+            <a:lvl1pPr algn="l">
+              <a:defRPr sz="1200"/>
+            </a:lvl1pPr>
+          </a:lstStyle>
+          <a:p>
+            <a:endParaRPr lang="en-US"/>
+          </a:p>
+        </p:txBody>
+      </p:sp>
+      <p:sp>
+        <p:nvSpPr>
+          <p:cNvPr id="7" name="Slide Number Placeholder 6"/>
+          <p:cNvSpPr>
+            <a:spLocks noGrp="1"/>
+          </p:cNvSpPr>
+          <p:nvPr>
+            <p:ph type="sldNum" sz="quarter" idx="5"/>
+          </p:nvPr>
+        </p:nvSpPr>
+        <p:spPr>
+          <a:xfrm>
+            <a:off x="3884613" y="8685213"/>
+            <a:ext cx="2971800" cy="457200"/>
+          </a:xfrm>
+          <a:prstGeom prst="rect">
+            <a:avLst/>
+          </a:prstGeom>
+        </p:spPr>
+        <p:txBody>
+          <a:bodyPr vert="horz" lIns="91440" tIns="45720" rIns="91440" bIns="45720" rtlCol="0" anchor="b"/>
+          <a:lstStyle>
+            <a:lvl1pPr algn="r">
+              <a:defRPr sz="1200"/>
+            </a:lvl1pPr>
+          </a:lstStyle>
+          <a:p>
+            <a:fld id="{A48E448A-101A-42EE-9ACF-820CCEC3BEA9}" type="slidenum">
+              <a:rPr lang="en-US" smtClean="0"/>
+              <a:pPr/>
+              <a:t>‹#›</a:t>
+            </a:fld>
+            <a:endParaRPr lang="en-US"/>
+          </a:p>
+        </p:txBody>
+      </p:sp>
+    </p:spTree>
+  </p:cSld>
+  <p:clrMap bg1="lt1" tx1="dk1" bg2="lt2" tx2="dk2" accent1="accent1" accent2="accent2" accent3="accent3" accent4="accent4" accent5="accent5" accent6="accent6" hlink="hlink" folHlink="folHlink"/>
+  <p:notesStyle>
+    <a:lvl1pPr marL="0" algn="l" defTabSz="914400" rtl="0" eaLnBrk="1" latinLnBrk="0" hangingPunct="1">
+      <a:defRPr sz="1200" kern="1200">
+        <a:solidFill>
+          <a:schemeClr val="tx1"/>
+        </a:solidFill>
+        <a:latin typeface="+mn-lt"/>
+        <a:ea typeface="+mn-ea"/>
+        <a:cs typeface="+mn-cs"/>
+      </a:defRPr>
+    </a:lvl1pPr>
+    <a:lvl2pPr marL="457200" algn="l" defTabSz="914400" rtl="0" eaLnBrk="1" latinLnBrk="0" hangingPunct="1">
+      <a:defRPr sz="1200" kern="1200">
+        <a:solidFill>
+          <a:schemeClr val="tx1"/>
+        </a:solidFill>
+        <a:latin typeface="+mn-lt"/>
+        <a:ea typeface="+mn-ea"/>
+        <a:cs typeface="+mn-cs"/>
+      </a:defRPr>
+    </a:lvl2pPr>
+    <a:lvl3pPr marL="914400" algn="l" defTabSz="914400" rtl="0" eaLnBrk="1" latinLnBrk="0" hangingPunct="1">
+      <a:defRPr sz="1200" kern="1200">
+        <a:solidFill>
+          <a:schemeClr val="tx1"/>
+        </a:solidFill>
+        <a:latin typeface="+mn-lt"/>
+        <a:ea typeface="+mn-ea"/>
+        <a:cs typeface="+mn-cs"/>
+      </a:defRPr>
+    </a:lvl3pPr>
+    <a:lvl4pPr marL="1371600" algn="l" defTabSz="914400" rtl="0" eaLnBrk="1" latinLnBrk="0" hangingPunct="1">
+      <a:defRPr sz="1200" kern="1200">
+        <a:solidFill>
+          <a:schemeClr val="tx1"/>
+        </a:solidFill>
+        <a:latin typeface="+mn-lt"/>
+        <a:ea typeface="+mn-ea"/>
+        <a:cs typeface="+mn-cs"/>
+      </a:defRPr>
+    </a:lvl4pPr>
+    <a:lvl5pPr marL="1828800" algn="l" defTabSz="914400" rtl="0" eaLnBrk="1" latinLnBrk="0" hangingPunct="1">
+      <a:defRPr sz="1200" kern="1200">
+        <a:solidFill>
+          <a:schemeClr val="tx1"/>
+        </a:solidFill>
+        <a:latin typeface="+mn-lt"/>
+        <a:ea typeface="+mn-ea"/>
+        <a:cs typeface="+mn-cs"/>
+      </a:defRPr>
+    </a:lvl5pPr>
+    <a:lvl6pPr marL="2286000" algn="l" defTabSz="914400" rtl="0" eaLnBrk="1" latinLnBrk="0" hangingPunct="1">
+      <a:defRPr sz="1200" kern="1200">
+        <a:solidFill>
+          <a:schemeClr val="tx1"/>
+        </a:solidFill>
+        <a:latin typeface="+mn-lt"/>
+        <a:ea typeface="+mn-ea"/>
+        <a:cs typeface="+mn-cs"/>
+      </a:defRPr>
+    </a:lvl6pPr>
+    <a:lvl7pPr marL="2743200" algn="l" defTabSz="914400" rtl="0" eaLnBrk="1" latinLnBrk="0" hangingPunct="1">
+      <a:defRPr sz="1200" kern="1200">
+        <a:solidFill>
+          <a:schemeClr val="tx1"/>
+        </a:solidFill>
+        <a:latin typeface="+mn-lt"/>
+        <a:ea typeface="+mn-ea"/>
+        <a:cs typeface="+mn-cs"/>
+      </a:defRPr>
+    </a:lvl7pPr>
+    <a:lvl8pPr marL="3200400" algn="l" defTabSz="914400" rtl="0" eaLnBrk="1" latinLnBrk="0" hangingPunct="1">
+      <a:defRPr sz="1200" kern="1200">
+        <a:solidFill>
+          <a:schemeClr val="tx1"/>
+        </a:solidFill>
+        <a:latin typeface="+mn-lt"/>
+        <a:ea typeface="+mn-ea"/>
+        <a:cs typeface="+mn-cs"/>
+      </a:defRPr>
+    </a:lvl8pPr>
+    <a:lvl9pPr marL="3657600" algn="l" defTabSz="914400" rtl="0" eaLnBrk="1" latinLnBrk="0" hangingPunct="1">
+      <a:defRPr sz="1200" kern="1200">
+        <a:solidFill>
+          <a:schemeClr val="tx1"/>
+        </a:solidFill>
+        <a:latin typeface="+mn-lt"/>
+        <a:ea typeface="+mn-ea"/>
+        <a:cs typeface="+mn-cs"/>
+      </a:defRPr>
+    </a:lvl9pPr>
+  </p:notesStyle>
+</p:notesMaster>
+</file>
+
+<file path=ppt/notesSlides/notesSlide1.xml><?xml version="1.0" encoding="utf-8"?>
+<p:notes xmlns:a="http://schemas.openxmlformats.org/drawingml/2006/main" xmlns:r="http://schemas.openxmlformats.org/officeDocument/2006/relationships" xmlns:p="http://schemas.openxmlformats.org/presentationml/2006/main">
+  <p:cSld>
+    <p:spTree>
+      <p:nvGrpSpPr>
+        <p:cNvPr id="1" name=""/>
+        <p:cNvGrpSpPr/>
+        <p:nvPr/>
+      </p:nvGrpSpPr>
+      <p:grpSpPr>
+        <a:xfrm>
+          <a:off x="0" y="0"/>
+          <a:ext cx="0" cy="0"/>
+          <a:chOff x="0" y="0"/>
+          <a:chExt cx="0" cy="0"/>
+        </a:xfrm>
+      </p:grpSpPr>
+      <p:sp>
+        <p:nvSpPr>
+          <p:cNvPr id="2" name="Slide Image Placeholder 1"/>
+          <p:cNvSpPr>
+            <a:spLocks noGrp="1" noRot="1" noChangeAspect="1"/>
+          </p:cNvSpPr>
+          <p:nvPr>
+            <p:ph type="sldImg"/>
+          </p:nvPr>
+        </p:nvSpPr>
+        <p:spPr/>
+      </p:sp>
+      <p:sp>
+        <p:nvSpPr>
+          <p:cNvPr id="3" name="Notes Placeholder 2"/>
+          <p:cNvSpPr>
+            <a:spLocks noGrp="1"/>
+          </p:cNvSpPr>
+          <p:nvPr>
+            <p:ph type="body" idx="1"/>
+          </p:nvPr>
+        </p:nvSpPr>
+        <p:spPr/>
+        <p:txBody>
+          <a:bodyPr>
+            <a:normAutofit/>
+          </a:bodyPr>
+          <a:lstStyle/>
+          <a:p>
+            <a:endParaRPr lang="en-US" dirty="0"/>
+          </a:p>
+        </p:txBody>
+      </p:sp>
+      <p:sp>
+        <p:nvSpPr>
+          <p:cNvPr id="4" name="Slide Number Placeholder 3"/>
+          <p:cNvSpPr>
+            <a:spLocks noGrp="1"/>
+          </p:cNvSpPr>
+          <p:nvPr>
+            <p:ph type="sldNum" sz="quarter" idx="10"/>
+          </p:nvPr>
+        </p:nvSpPr>
+        <p:spPr/>
+        <p:txBody>
+          <a:bodyPr/>
+          <a:lstStyle/>
+          <a:p>
+            <a:fld id="{A48E448A-101A-42EE-9ACF-820CCEC3BEA9}" type="slidenum">
+              <a:rPr lang="en-US" smtClean="0"/>
+              <a:pPr/>
+              <a:t>36</a:t>
+            </a:fld>
+            <a:endParaRPr lang="en-US"/>
+          </a:p>
+        </p:txBody>
+      </p:sp>
+    </p:spTree>
+  </p:cSld>
+  <p:clrMapOvr>
+    <a:masterClrMapping/>
+  </p:clrMapOvr>
+</p:notes>
+</file>
+
 <file path=ppt/slideLayouts/slideLayout1.xml><?xml version="1.0" encoding="utf-8"?>
 <p:sldLayout xmlns:a="http://schemas.openxmlformats.org/drawingml/2006/main" xmlns:r="http://schemas.openxmlformats.org/officeDocument/2006/relationships" xmlns:p="http://schemas.openxmlformats.org/presentationml/2006/main" type="title" preserve="1">
   <p:cSld name="Title Slide">
@@ -323,7 +758,7 @@
             <a:fld id="{D22E22CB-403C-4FA1-9A08-6AEAEE252FE1}" type="datetimeFigureOut">
               <a:rPr lang="en-US" smtClean="0"/>
               <a:pPr/>
-              <a:t>8/8/2016</a:t>
+              <a:t>8/16/2016</a:t>
             </a:fld>
             <a:endParaRPr lang="en-US"/>
           </a:p>
@@ -490,7 +925,7 @@
             <a:fld id="{D22E22CB-403C-4FA1-9A08-6AEAEE252FE1}" type="datetimeFigureOut">
               <a:rPr lang="en-US" smtClean="0"/>
               <a:pPr/>
-              <a:t>8/8/2016</a:t>
+              <a:t>8/16/2016</a:t>
             </a:fld>
             <a:endParaRPr lang="en-US"/>
           </a:p>
@@ -667,7 +1102,7 @@
             <a:fld id="{D22E22CB-403C-4FA1-9A08-6AEAEE252FE1}" type="datetimeFigureOut">
               <a:rPr lang="en-US" smtClean="0"/>
               <a:pPr/>
-              <a:t>8/8/2016</a:t>
+              <a:t>8/16/2016</a:t>
             </a:fld>
             <a:endParaRPr lang="en-US"/>
           </a:p>
@@ -834,7 +1269,7 @@
             <a:fld id="{D22E22CB-403C-4FA1-9A08-6AEAEE252FE1}" type="datetimeFigureOut">
               <a:rPr lang="en-US" smtClean="0"/>
               <a:pPr/>
-              <a:t>8/8/2016</a:t>
+              <a:t>8/16/2016</a:t>
             </a:fld>
             <a:endParaRPr lang="en-US"/>
           </a:p>
@@ -1077,7 +1512,7 @@
             <a:fld id="{D22E22CB-403C-4FA1-9A08-6AEAEE252FE1}" type="datetimeFigureOut">
               <a:rPr lang="en-US" smtClean="0"/>
               <a:pPr/>
-              <a:t>8/8/2016</a:t>
+              <a:t>8/16/2016</a:t>
             </a:fld>
             <a:endParaRPr lang="en-US"/>
           </a:p>
@@ -1362,7 +1797,7 @@
             <a:fld id="{D22E22CB-403C-4FA1-9A08-6AEAEE252FE1}" type="datetimeFigureOut">
               <a:rPr lang="en-US" smtClean="0"/>
               <a:pPr/>
-              <a:t>8/8/2016</a:t>
+              <a:t>8/16/2016</a:t>
             </a:fld>
             <a:endParaRPr lang="en-US"/>
           </a:p>
@@ -1781,7 +2216,7 @@
             <a:fld id="{D22E22CB-403C-4FA1-9A08-6AEAEE252FE1}" type="datetimeFigureOut">
               <a:rPr lang="en-US" smtClean="0"/>
               <a:pPr/>
-              <a:t>8/8/2016</a:t>
+              <a:t>8/16/2016</a:t>
             </a:fld>
             <a:endParaRPr lang="en-US"/>
           </a:p>
@@ -1896,7 +2331,7 @@
             <a:fld id="{D22E22CB-403C-4FA1-9A08-6AEAEE252FE1}" type="datetimeFigureOut">
               <a:rPr lang="en-US" smtClean="0"/>
               <a:pPr/>
-              <a:t>8/8/2016</a:t>
+              <a:t>8/16/2016</a:t>
             </a:fld>
             <a:endParaRPr lang="en-US"/>
           </a:p>
@@ -1988,7 +2423,7 @@
             <a:fld id="{D22E22CB-403C-4FA1-9A08-6AEAEE252FE1}" type="datetimeFigureOut">
               <a:rPr lang="en-US" smtClean="0"/>
               <a:pPr/>
-              <a:t>8/8/2016</a:t>
+              <a:t>8/16/2016</a:t>
             </a:fld>
             <a:endParaRPr lang="en-US"/>
           </a:p>
@@ -2262,7 +2697,7 @@
             <a:fld id="{D22E22CB-403C-4FA1-9A08-6AEAEE252FE1}" type="datetimeFigureOut">
               <a:rPr lang="en-US" smtClean="0"/>
               <a:pPr/>
-              <a:t>8/8/2016</a:t>
+              <a:t>8/16/2016</a:t>
             </a:fld>
             <a:endParaRPr lang="en-US"/>
           </a:p>
@@ -2512,7 +2947,7 @@
             <a:fld id="{D22E22CB-403C-4FA1-9A08-6AEAEE252FE1}" type="datetimeFigureOut">
               <a:rPr lang="en-US" smtClean="0"/>
               <a:pPr/>
-              <a:t>8/8/2016</a:t>
+              <a:t>8/16/2016</a:t>
             </a:fld>
             <a:endParaRPr lang="en-US"/>
           </a:p>
@@ -2722,7 +3157,7 @@
             <a:fld id="{D22E22CB-403C-4FA1-9A08-6AEAEE252FE1}" type="datetimeFigureOut">
               <a:rPr lang="en-US" smtClean="0"/>
               <a:pPr/>
-              <a:t>8/8/2016</a:t>
+              <a:t>8/16/2016</a:t>
             </a:fld>
             <a:endParaRPr lang="en-US"/>
           </a:p>
@@ -3144,6 +3579,13 @@
   <p:clrMapOvr>
     <a:masterClrMapping/>
   </p:clrMapOvr>
+  <p:timing>
+    <p:tnLst>
+      <p:par>
+        <p:cTn id="1" dur="indefinite" restart="never" nodeType="tmRoot"/>
+      </p:par>
+    </p:tnLst>
+  </p:timing>
 </p:sld>
 </file>
 
@@ -3443,6 +3885,38 @@
           <a:xfrm>
             <a:off x="611560" y="4941168"/>
             <a:ext cx="4210050" cy="1714500"/>
+          </a:xfrm>
+          <a:prstGeom prst="rect">
+            <a:avLst/>
+          </a:prstGeom>
+          <a:noFill/>
+          <a:ln w="9525">
+            <a:noFill/>
+            <a:miter lim="800000"/>
+            <a:headEnd/>
+            <a:tailEnd/>
+          </a:ln>
+        </p:spPr>
+      </p:pic>
+      <p:pic>
+        <p:nvPicPr>
+          <p:cNvPr id="17409" name="Picture 1"/>
+          <p:cNvPicPr>
+            <a:picLocks noChangeAspect="1" noChangeArrowheads="1"/>
+          </p:cNvPicPr>
+          <p:nvPr/>
+        </p:nvPicPr>
+        <p:blipFill>
+          <a:blip r:embed="rId3" cstate="print"/>
+          <a:srcRect/>
+          <a:stretch>
+            <a:fillRect/>
+          </a:stretch>
+        </p:blipFill>
+        <p:spPr bwMode="auto">
+          <a:xfrm>
+            <a:off x="3619061" y="5877273"/>
+            <a:ext cx="4774399" cy="980728"/>
           </a:xfrm>
           <a:prstGeom prst="rect">
             <a:avLst/>
@@ -5978,11 +6452,7 @@
             </a:r>
             <a:r>
               <a:rPr lang="zh-TW" altLang="en-US" dirty="0" smtClean="0"/>
-              <a:t>之間的值的機率是一樣</a:t>
-            </a:r>
-            <a:r>
-              <a:rPr lang="zh-TW" altLang="en-US" dirty="0" smtClean="0"/>
-              <a:t>的</a:t>
+              <a:t>之間的值的機率是一樣的</a:t>
             </a:r>
             <a:endParaRPr lang="en-US" altLang="zh-TW" dirty="0" smtClean="0"/>
           </a:p>
@@ -6003,17 +6473,8 @@
               <a:rPr lang="en-US" altLang="zh-TW" dirty="0" smtClean="0">
                 <a:sym typeface="Symbol"/>
               </a:rPr>
-              <a:t>: </a:t>
-            </a:r>
-            <a:r>
-              <a:rPr lang="en-US" altLang="zh-TW" dirty="0" smtClean="0">
-                <a:sym typeface="Symbol"/>
-              </a:rPr>
-              <a:t>min</a:t>
-            </a:r>
-            <a:endParaRPr lang="en-US" altLang="zh-TW" dirty="0" smtClean="0">
-              <a:sym typeface="Symbol"/>
-            </a:endParaRPr>
+              <a:t>: min</a:t>
+            </a:r>
           </a:p>
           <a:p>
             <a:pPr lvl="2"/>
@@ -6152,6 +6613,38 @@
           <a:xfrm>
             <a:off x="611560" y="4077072"/>
             <a:ext cx="5124450" cy="2533650"/>
+          </a:xfrm>
+          <a:prstGeom prst="rect">
+            <a:avLst/>
+          </a:prstGeom>
+          <a:noFill/>
+          <a:ln w="9525">
+            <a:noFill/>
+            <a:miter lim="800000"/>
+            <a:headEnd/>
+            <a:tailEnd/>
+          </a:ln>
+        </p:spPr>
+      </p:pic>
+      <p:pic>
+        <p:nvPicPr>
+          <p:cNvPr id="4" name="Picture 1"/>
+          <p:cNvPicPr>
+            <a:picLocks noChangeAspect="1" noChangeArrowheads="1"/>
+          </p:cNvPicPr>
+          <p:nvPr/>
+        </p:nvPicPr>
+        <p:blipFill>
+          <a:blip r:embed="rId3" cstate="print"/>
+          <a:srcRect/>
+          <a:stretch>
+            <a:fillRect/>
+          </a:stretch>
+        </p:blipFill>
+        <p:spPr bwMode="auto">
+          <a:xfrm>
+            <a:off x="4211960" y="6093296"/>
+            <a:ext cx="4181475" cy="438150"/>
           </a:xfrm>
           <a:prstGeom prst="rect">
             <a:avLst/>
@@ -6272,24 +6765,14 @@
           <a:p>
             <a:r>
               <a:rPr lang="en-US" sz="1200" dirty="0" smtClean="0"/>
-              <a:t>mean = </a:t>
-            </a:r>
+              <a:t>mean = 5</a:t>
+            </a:r>
+          </a:p>
+          <a:p>
             <a:r>
               <a:rPr lang="en-US" sz="1200" dirty="0" smtClean="0"/>
-              <a:t>5</a:t>
-            </a:r>
-            <a:endParaRPr lang="en-US" sz="1200" dirty="0" smtClean="0"/>
-          </a:p>
-          <a:p>
-            <a:r>
-              <a:rPr lang="en-US" sz="1200" dirty="0" smtClean="0"/>
-              <a:t>variance = </a:t>
-            </a:r>
-            <a:r>
-              <a:rPr lang="en-US" sz="1200" dirty="0" smtClean="0"/>
-              <a:t>1.33</a:t>
-            </a:r>
-            <a:endParaRPr lang="en-US" sz="1200" dirty="0" smtClean="0"/>
+              <a:t>variance = 1.33</a:t>
+            </a:r>
           </a:p>
         </p:txBody>
       </p:sp>
@@ -6335,22 +6818,13 @@
           <a:p>
             <a:r>
               <a:rPr lang="en-US" sz="1200" dirty="0" smtClean="0"/>
-              <a:t>mean = </a:t>
-            </a:r>
+              <a:t>mean = 6</a:t>
+            </a:r>
+          </a:p>
+          <a:p>
             <a:r>
               <a:rPr lang="en-US" sz="1200" dirty="0" smtClean="0"/>
-              <a:t>6</a:t>
-            </a:r>
-            <a:endParaRPr lang="en-US" sz="1200" dirty="0" smtClean="0"/>
-          </a:p>
-          <a:p>
-            <a:r>
-              <a:rPr lang="en-US" sz="1200" dirty="0" smtClean="0"/>
-              <a:t>variance = </a:t>
-            </a:r>
-            <a:r>
-              <a:rPr lang="en-US" sz="1200" dirty="0" smtClean="0"/>
-              <a:t>3</a:t>
+              <a:t>variance = 3</a:t>
             </a:r>
             <a:endParaRPr lang="en-US" sz="1200" dirty="0"/>
           </a:p>
@@ -6398,22 +6872,13 @@
           <a:p>
             <a:r>
               <a:rPr lang="en-US" sz="1200" dirty="0" smtClean="0"/>
-              <a:t>mean = </a:t>
-            </a:r>
+              <a:t>mean = 3.25</a:t>
+            </a:r>
+          </a:p>
+          <a:p>
             <a:r>
               <a:rPr lang="en-US" sz="1200" dirty="0" smtClean="0"/>
-              <a:t>3.25</a:t>
-            </a:r>
-            <a:endParaRPr lang="en-US" sz="1200" dirty="0" smtClean="0"/>
-          </a:p>
-          <a:p>
-            <a:r>
-              <a:rPr lang="en-US" sz="1200" dirty="0" smtClean="0"/>
-              <a:t>variance = </a:t>
-            </a:r>
-            <a:r>
-              <a:rPr lang="en-US" sz="1200" dirty="0" smtClean="0"/>
-              <a:t>0.02</a:t>
+              <a:t>variance = 0.02</a:t>
             </a:r>
             <a:endParaRPr lang="en-US" sz="1200" dirty="0"/>
           </a:p>
@@ -7801,15 +8266,7 @@
                   <a:srgbClr val="FF0000"/>
                 </a:solidFill>
               </a:rPr>
-              <a:t>積</a:t>
-            </a:r>
-            <a:r>
-              <a:rPr lang="zh-TW" altLang="en-US" dirty="0" smtClean="0">
-                <a:solidFill>
-                  <a:srgbClr val="FF0000"/>
-                </a:solidFill>
-              </a:rPr>
-              <a:t>分</a:t>
+              <a:t>積分</a:t>
             </a:r>
             <a:endParaRPr lang="en-US" dirty="0"/>
           </a:p>
@@ -7842,15 +8299,7 @@
                   <a:srgbClr val="FF0000"/>
                 </a:solidFill>
               </a:rPr>
-              <a:t>微</a:t>
-            </a:r>
-            <a:r>
-              <a:rPr lang="zh-TW" altLang="en-US" dirty="0" smtClean="0">
-                <a:solidFill>
-                  <a:srgbClr val="FF0000"/>
-                </a:solidFill>
-              </a:rPr>
-              <a:t>分</a:t>
+              <a:t>微分</a:t>
             </a:r>
             <a:endParaRPr lang="en-US" dirty="0"/>
           </a:p>
@@ -8181,11 +8630,7 @@
             </a:r>
             <a:r>
               <a:rPr lang="zh-TW" altLang="en-US" dirty="0" smtClean="0"/>
-              <a:t>單位時</a:t>
-            </a:r>
-            <a:r>
-              <a:rPr lang="zh-TW" altLang="en-US" dirty="0" smtClean="0"/>
-              <a:t>間</a:t>
+              <a:t>單位時間</a:t>
             </a:r>
             <a:endParaRPr lang="en-US" altLang="zh-TW" dirty="0" smtClean="0"/>
           </a:p>
@@ -8213,11 +8658,7 @@
           <a:p>
             <a:r>
               <a:rPr lang="en-US" dirty="0" smtClean="0"/>
-              <a:t>R </a:t>
-            </a:r>
-            <a:r>
-              <a:rPr lang="en-US" dirty="0" smtClean="0"/>
-              <a:t>function</a:t>
+              <a:t>R function</a:t>
             </a:r>
           </a:p>
           <a:p>
@@ -8346,6 +8787,38 @@
           <a:xfrm>
             <a:off x="611560" y="4149080"/>
             <a:ext cx="3914775" cy="2162175"/>
+          </a:xfrm>
+          <a:prstGeom prst="rect">
+            <a:avLst/>
+          </a:prstGeom>
+          <a:noFill/>
+          <a:ln w="9525">
+            <a:noFill/>
+            <a:miter lim="800000"/>
+            <a:headEnd/>
+            <a:tailEnd/>
+          </a:ln>
+        </p:spPr>
+      </p:pic>
+      <p:pic>
+        <p:nvPicPr>
+          <p:cNvPr id="9217" name="Picture 1"/>
+          <p:cNvPicPr>
+            <a:picLocks noChangeAspect="1" noChangeArrowheads="1"/>
+          </p:cNvPicPr>
+          <p:nvPr/>
+        </p:nvPicPr>
+        <p:blipFill>
+          <a:blip r:embed="rId3" cstate="print"/>
+          <a:srcRect/>
+          <a:stretch>
+            <a:fillRect/>
+          </a:stretch>
+        </p:blipFill>
+        <p:spPr bwMode="auto">
+          <a:xfrm>
+            <a:off x="3635896" y="5589240"/>
+            <a:ext cx="4819278" cy="1133454"/>
           </a:xfrm>
           <a:prstGeom prst="rect">
             <a:avLst/>
@@ -8492,24 +8965,14 @@
           <a:p>
             <a:r>
               <a:rPr lang="en-US" sz="1200" dirty="0" smtClean="0"/>
-              <a:t>mean = </a:t>
-            </a:r>
+              <a:t>mean = 2</a:t>
+            </a:r>
+          </a:p>
+          <a:p>
             <a:r>
               <a:rPr lang="en-US" sz="1200" dirty="0" smtClean="0"/>
-              <a:t>2</a:t>
-            </a:r>
-            <a:endParaRPr lang="en-US" sz="1200" dirty="0" smtClean="0"/>
-          </a:p>
-          <a:p>
-            <a:r>
-              <a:rPr lang="en-US" sz="1200" dirty="0" smtClean="0"/>
-              <a:t>variance = </a:t>
-            </a:r>
-            <a:r>
-              <a:rPr lang="en-US" sz="1200" dirty="0" smtClean="0"/>
-              <a:t>4</a:t>
-            </a:r>
-            <a:endParaRPr lang="en-US" sz="1200" dirty="0" smtClean="0"/>
+              <a:t>variance = 4</a:t>
+            </a:r>
           </a:p>
         </p:txBody>
       </p:sp>
@@ -8549,22 +9012,13 @@
           <a:p>
             <a:r>
               <a:rPr lang="en-US" sz="1200" dirty="0" smtClean="0"/>
-              <a:t>mean = </a:t>
-            </a:r>
+              <a:t>mean = 1</a:t>
+            </a:r>
+          </a:p>
+          <a:p>
             <a:r>
               <a:rPr lang="en-US" sz="1200" dirty="0" smtClean="0"/>
-              <a:t>1</a:t>
-            </a:r>
-            <a:endParaRPr lang="en-US" sz="1200" dirty="0" smtClean="0"/>
-          </a:p>
-          <a:p>
-            <a:r>
-              <a:rPr lang="en-US" sz="1200" dirty="0" smtClean="0"/>
-              <a:t>variance = </a:t>
-            </a:r>
-            <a:r>
-              <a:rPr lang="en-US" sz="1200" dirty="0" smtClean="0"/>
-              <a:t>1</a:t>
+              <a:t>variance = 1</a:t>
             </a:r>
             <a:endParaRPr lang="en-US" sz="1200" dirty="0"/>
           </a:p>
@@ -8606,26 +9060,13 @@
           <a:p>
             <a:r>
               <a:rPr lang="en-US" sz="1200" dirty="0" smtClean="0"/>
-              <a:t>mean = </a:t>
-            </a:r>
+              <a:t>mean = 0.5</a:t>
+            </a:r>
+          </a:p>
+          <a:p>
             <a:r>
               <a:rPr lang="en-US" sz="1200" dirty="0" smtClean="0"/>
-              <a:t>0.5</a:t>
-            </a:r>
-            <a:endParaRPr lang="en-US" sz="1200" dirty="0" smtClean="0"/>
-          </a:p>
-          <a:p>
-            <a:r>
-              <a:rPr lang="en-US" sz="1200" dirty="0" smtClean="0"/>
-              <a:t>variance = </a:t>
-            </a:r>
-            <a:r>
-              <a:rPr lang="en-US" sz="1200" dirty="0" smtClean="0"/>
-              <a:t>0</a:t>
-            </a:r>
-            <a:r>
-              <a:rPr lang="en-US" sz="1200" dirty="0" smtClean="0"/>
-              <a:t>.25</a:t>
+              <a:t>variance = 0.25</a:t>
             </a:r>
             <a:endParaRPr lang="en-US" sz="1200" dirty="0"/>
           </a:p>
@@ -10342,13 +10783,7 @@
               <a:rPr lang="zh-TW" altLang="en-US" dirty="0" smtClean="0">
                 <a:sym typeface="Symbol"/>
               </a:rPr>
-              <a:t>單位時間發生次</a:t>
-            </a:r>
-            <a:r>
-              <a:rPr lang="zh-TW" altLang="en-US" dirty="0" smtClean="0">
-                <a:sym typeface="Symbol"/>
-              </a:rPr>
-              <a:t>數</a:t>
+              <a:t>單位時間發生次數</a:t>
             </a:r>
             <a:endParaRPr lang="en-US" altLang="zh-TW" dirty="0" smtClean="0">
               <a:sym typeface="Symbol"/>
@@ -10378,13 +10813,7 @@
               <a:rPr lang="en-US" altLang="zh-TW" dirty="0" smtClean="0">
                 <a:sym typeface="Symbol"/>
               </a:rPr>
-              <a:t> </a:t>
-            </a:r>
-            <a:r>
-              <a:rPr lang="en-US" altLang="zh-TW" dirty="0" smtClean="0">
-                <a:sym typeface="Symbol"/>
-              </a:rPr>
-              <a:t>=1/2</a:t>
+              <a:t> =1/2</a:t>
             </a:r>
             <a:r>
               <a:rPr lang="zh-TW" altLang="en-US" dirty="0" smtClean="0">
@@ -10530,6 +10959,38 @@
           <a:xfrm>
             <a:off x="539552" y="4800600"/>
             <a:ext cx="4610100" cy="2057400"/>
+          </a:xfrm>
+          <a:prstGeom prst="rect">
+            <a:avLst/>
+          </a:prstGeom>
+          <a:noFill/>
+          <a:ln w="9525">
+            <a:noFill/>
+            <a:miter lim="800000"/>
+            <a:headEnd/>
+            <a:tailEnd/>
+          </a:ln>
+        </p:spPr>
+      </p:pic>
+      <p:pic>
+        <p:nvPicPr>
+          <p:cNvPr id="7169" name="Picture 1"/>
+          <p:cNvPicPr>
+            <a:picLocks noChangeAspect="1" noChangeArrowheads="1"/>
+          </p:cNvPicPr>
+          <p:nvPr/>
+        </p:nvPicPr>
+        <p:blipFill>
+          <a:blip r:embed="rId3" cstate="print"/>
+          <a:srcRect/>
+          <a:stretch>
+            <a:fillRect/>
+          </a:stretch>
+        </p:blipFill>
+        <p:spPr bwMode="auto">
+          <a:xfrm>
+            <a:off x="4139952" y="5949280"/>
+            <a:ext cx="4324350" cy="723900"/>
           </a:xfrm>
           <a:prstGeom prst="rect">
             <a:avLst/>
@@ -10650,22 +11111,13 @@
           <a:p>
             <a:r>
               <a:rPr lang="en-US" sz="1200" dirty="0" smtClean="0"/>
-              <a:t>mean = </a:t>
-            </a:r>
+              <a:t>mean = 1</a:t>
+            </a:r>
+          </a:p>
+          <a:p>
             <a:r>
               <a:rPr lang="en-US" sz="1200" dirty="0" smtClean="0"/>
-              <a:t>1</a:t>
-            </a:r>
-            <a:endParaRPr lang="en-US" sz="1200" dirty="0" smtClean="0"/>
-          </a:p>
-          <a:p>
-            <a:r>
-              <a:rPr lang="en-US" sz="1200" dirty="0" smtClean="0"/>
-              <a:t>variance = </a:t>
-            </a:r>
-            <a:r>
-              <a:rPr lang="en-US" sz="1200" dirty="0" smtClean="0"/>
-              <a:t>1</a:t>
+              <a:t>variance = 1</a:t>
             </a:r>
             <a:endParaRPr lang="en-US" sz="1200" dirty="0"/>
           </a:p>
@@ -10713,24 +11165,14 @@
           <a:p>
             <a:r>
               <a:rPr lang="en-US" sz="1200" dirty="0" smtClean="0"/>
-              <a:t>mean = </a:t>
-            </a:r>
+              <a:t>mean = 1/2/4</a:t>
+            </a:r>
+          </a:p>
+          <a:p>
             <a:r>
               <a:rPr lang="en-US" sz="1200" dirty="0" smtClean="0"/>
-              <a:t>1/2/4</a:t>
-            </a:r>
-            <a:endParaRPr lang="en-US" sz="1200" dirty="0" smtClean="0"/>
-          </a:p>
-          <a:p>
-            <a:r>
-              <a:rPr lang="en-US" sz="1200" dirty="0" smtClean="0"/>
-              <a:t>variance = </a:t>
-            </a:r>
-            <a:r>
-              <a:rPr lang="en-US" sz="1200" dirty="0" smtClean="0"/>
-              <a:t>1/2/4</a:t>
-            </a:r>
-            <a:endParaRPr lang="en-US" sz="1200" dirty="0" smtClean="0"/>
+              <a:t>variance = 1/2/4</a:t>
+            </a:r>
           </a:p>
         </p:txBody>
       </p:sp>
@@ -10776,22 +11218,13 @@
           <a:p>
             <a:r>
               <a:rPr lang="en-US" sz="1200" dirty="0" smtClean="0"/>
-              <a:t>mean = </a:t>
-            </a:r>
+              <a:t>mean = 1/2/4</a:t>
+            </a:r>
+          </a:p>
+          <a:p>
             <a:r>
               <a:rPr lang="en-US" sz="1200" dirty="0" smtClean="0"/>
-              <a:t>1/2/4</a:t>
-            </a:r>
-            <a:endParaRPr lang="en-US" sz="1200" dirty="0" smtClean="0"/>
-          </a:p>
-          <a:p>
-            <a:r>
-              <a:rPr lang="en-US" sz="1200" dirty="0" smtClean="0"/>
-              <a:t>variance = </a:t>
-            </a:r>
-            <a:r>
-              <a:rPr lang="en-US" sz="1200" dirty="0" smtClean="0"/>
-              <a:t>0.5/2/8</a:t>
+              <a:t>variance = 0.5/2/8</a:t>
             </a:r>
             <a:endParaRPr lang="en-US" sz="1200" dirty="0"/>
           </a:p>
@@ -16869,6 +17302,38 @@
           <a:xfrm>
             <a:off x="1259632" y="1522608"/>
             <a:ext cx="2619696" cy="1080120"/>
+          </a:xfrm>
+          <a:prstGeom prst="rect">
+            <a:avLst/>
+          </a:prstGeom>
+          <a:noFill/>
+          <a:ln w="9525">
+            <a:noFill/>
+            <a:miter lim="800000"/>
+            <a:headEnd/>
+            <a:tailEnd/>
+          </a:ln>
+        </p:spPr>
+      </p:pic>
+      <p:pic>
+        <p:nvPicPr>
+          <p:cNvPr id="4097" name="Picture 1"/>
+          <p:cNvPicPr>
+            <a:picLocks noChangeAspect="1" noChangeArrowheads="1"/>
+          </p:cNvPicPr>
+          <p:nvPr/>
+        </p:nvPicPr>
+        <p:blipFill>
+          <a:blip r:embed="rId4" cstate="print"/>
+          <a:srcRect/>
+          <a:stretch>
+            <a:fillRect/>
+          </a:stretch>
+        </p:blipFill>
+        <p:spPr bwMode="auto">
+          <a:xfrm>
+            <a:off x="4001294" y="5949280"/>
+            <a:ext cx="5142706" cy="396920"/>
           </a:xfrm>
           <a:prstGeom prst="rect">
             <a:avLst/>
@@ -17021,22 +17486,13 @@
           <a:p>
             <a:r>
               <a:rPr lang="en-US" sz="1200" dirty="0" smtClean="0"/>
-              <a:t>mean = </a:t>
-            </a:r>
+              <a:t>mean = 0.5</a:t>
+            </a:r>
+          </a:p>
+          <a:p>
             <a:r>
               <a:rPr lang="en-US" sz="1200" dirty="0" smtClean="0"/>
-              <a:t>0.5</a:t>
-            </a:r>
-            <a:endParaRPr lang="en-US" sz="1200" dirty="0" smtClean="0"/>
-          </a:p>
-          <a:p>
-            <a:r>
-              <a:rPr lang="en-US" sz="1200" dirty="0" smtClean="0"/>
-              <a:t>variance = </a:t>
-            </a:r>
-            <a:r>
-              <a:rPr lang="en-US" sz="1200" dirty="0" smtClean="0"/>
-              <a:t>0.011</a:t>
+              <a:t>variance = 0.011</a:t>
             </a:r>
             <a:endParaRPr lang="en-US" sz="1200" dirty="0"/>
           </a:p>
@@ -17078,24 +17534,14 @@
           <a:p>
             <a:r>
               <a:rPr lang="en-US" sz="1200" dirty="0" smtClean="0"/>
-              <a:t>mean = </a:t>
-            </a:r>
+              <a:t>mean = 0.5/0.5/0.5</a:t>
+            </a:r>
+          </a:p>
+          <a:p>
             <a:r>
               <a:rPr lang="en-US" sz="1200" dirty="0" smtClean="0"/>
-              <a:t>0.5/0.5/0.5</a:t>
-            </a:r>
-            <a:endParaRPr lang="en-US" sz="1200" dirty="0" smtClean="0"/>
-          </a:p>
-          <a:p>
-            <a:r>
-              <a:rPr lang="en-US" sz="1200" dirty="0" smtClean="0"/>
-              <a:t>variance = </a:t>
-            </a:r>
-            <a:r>
-              <a:rPr lang="en-US" sz="1200" dirty="0" smtClean="0"/>
-              <a:t>0.011/0.036/0.083</a:t>
-            </a:r>
-            <a:endParaRPr lang="en-US" sz="1200" dirty="0" smtClean="0"/>
+              <a:t>variance = 0.011/0.036/0.083</a:t>
+            </a:r>
           </a:p>
         </p:txBody>
       </p:sp>
@@ -17163,20 +17609,11 @@
               </a:rPr>
               <a:t>0.05</a:t>
             </a:r>
-            <a:endParaRPr lang="en-US" sz="1200" dirty="0" smtClean="0">
-              <a:solidFill>
-                <a:srgbClr val="00B0F0"/>
-              </a:solidFill>
-            </a:endParaRPr>
           </a:p>
           <a:p>
             <a:r>
               <a:rPr lang="en-US" sz="1200" dirty="0" smtClean="0"/>
-              <a:t>variance = </a:t>
-            </a:r>
-            <a:r>
-              <a:rPr lang="en-US" sz="1200" dirty="0" smtClean="0"/>
-              <a:t>0.00039/0.00331</a:t>
+              <a:t>variance = 0.00039/0.00331</a:t>
             </a:r>
             <a:endParaRPr lang="en-US" sz="1200" dirty="0"/>
           </a:p>
@@ -18327,20 +18764,11 @@
               </a:rPr>
               <a:t>0.95</a:t>
             </a:r>
-            <a:endParaRPr lang="en-US" sz="1200" dirty="0" smtClean="0">
-              <a:solidFill>
-                <a:srgbClr val="00B0F0"/>
-              </a:solidFill>
-            </a:endParaRPr>
           </a:p>
           <a:p>
             <a:r>
               <a:rPr lang="en-US" sz="1200" dirty="0" smtClean="0"/>
-              <a:t>variance = </a:t>
-            </a:r>
-            <a:r>
-              <a:rPr lang="en-US" sz="1200" dirty="0" smtClean="0"/>
-              <a:t>0.00039/0.00331</a:t>
+              <a:t>variance = 0.00039/0.00331</a:t>
             </a:r>
             <a:endParaRPr lang="en-US" sz="1200" dirty="0"/>
           </a:p>
@@ -18351,6 +18779,13 @@
   <p:clrMapOvr>
     <a:masterClrMapping/>
   </p:clrMapOvr>
+  <p:timing>
+    <p:tnLst>
+      <p:par>
+        <p:cTn id="1" dur="indefinite" restart="never" nodeType="tmRoot"/>
+      </p:par>
+    </p:tnLst>
+  </p:timing>
 </p:sld>
 </file>
 
@@ -18679,11 +19114,50 @@
           </a:ln>
         </p:spPr>
       </p:pic>
+      <p:pic>
+        <p:nvPicPr>
+          <p:cNvPr id="2049" name="Picture 1"/>
+          <p:cNvPicPr>
+            <a:picLocks noChangeAspect="1" noChangeArrowheads="1"/>
+          </p:cNvPicPr>
+          <p:nvPr/>
+        </p:nvPicPr>
+        <p:blipFill>
+          <a:blip r:embed="rId3" cstate="print"/>
+          <a:srcRect/>
+          <a:stretch>
+            <a:fillRect/>
+          </a:stretch>
+        </p:blipFill>
+        <p:spPr bwMode="auto">
+          <a:xfrm>
+            <a:off x="3707904" y="6309320"/>
+            <a:ext cx="4200525" cy="390525"/>
+          </a:xfrm>
+          <a:prstGeom prst="rect">
+            <a:avLst/>
+          </a:prstGeom>
+          <a:noFill/>
+          <a:ln w="9525">
+            <a:noFill/>
+            <a:miter lim="800000"/>
+            <a:headEnd/>
+            <a:tailEnd/>
+          </a:ln>
+        </p:spPr>
+      </p:pic>
     </p:spTree>
   </p:cSld>
   <p:clrMapOvr>
     <a:masterClrMapping/>
   </p:clrMapOvr>
+  <p:timing>
+    <p:tnLst>
+      <p:par>
+        <p:cTn id="1" dur="indefinite" restart="never" nodeType="tmRoot"/>
+      </p:par>
+    </p:tnLst>
+  </p:timing>
 </p:sld>
 </file>
 
@@ -18815,22 +19289,13 @@
           <a:p>
             <a:r>
               <a:rPr lang="en-US" sz="1200" dirty="0" smtClean="0"/>
-              <a:t>mean = </a:t>
-            </a:r>
+              <a:t>mean = 0</a:t>
+            </a:r>
+          </a:p>
+          <a:p>
             <a:r>
               <a:rPr lang="en-US" sz="1200" dirty="0" smtClean="0"/>
-              <a:t>0</a:t>
-            </a:r>
-            <a:endParaRPr lang="en-US" sz="1200" dirty="0" smtClean="0"/>
-          </a:p>
-          <a:p>
-            <a:r>
-              <a:rPr lang="en-US" sz="1200" dirty="0" smtClean="0"/>
-              <a:t>variance = </a:t>
-            </a:r>
-            <a:r>
-              <a:rPr lang="en-US" sz="1200" dirty="0" smtClean="0"/>
-              <a:t>0.25</a:t>
+              <a:t>variance = 0.25</a:t>
             </a:r>
             <a:endParaRPr lang="en-US" sz="1200" dirty="0"/>
           </a:p>
@@ -18882,24 +19347,14 @@
           <a:p>
             <a:r>
               <a:rPr lang="en-US" sz="1200" dirty="0" smtClean="0"/>
-              <a:t>mean = </a:t>
-            </a:r>
+              <a:t>mean = 0/0/0</a:t>
+            </a:r>
+          </a:p>
+          <a:p>
             <a:r>
               <a:rPr lang="en-US" sz="1200" dirty="0" smtClean="0"/>
-              <a:t>0/0/0</a:t>
-            </a:r>
-            <a:endParaRPr lang="en-US" sz="1200" dirty="0" smtClean="0"/>
-          </a:p>
-          <a:p>
-            <a:r>
-              <a:rPr lang="en-US" sz="1200" dirty="0" smtClean="0"/>
-              <a:t>variance = </a:t>
-            </a:r>
-            <a:r>
-              <a:rPr lang="en-US" sz="1200" dirty="0" smtClean="0"/>
-              <a:t>0.25/1/25</a:t>
-            </a:r>
-            <a:endParaRPr lang="en-US" sz="1200" dirty="0" smtClean="0"/>
+              <a:t>variance = 0.25/1/25</a:t>
+            </a:r>
           </a:p>
         </p:txBody>
       </p:sp>
@@ -19701,24 +20156,14 @@
           <a:p>
             <a:r>
               <a:rPr lang="en-US" sz="1200" dirty="0" smtClean="0"/>
-              <a:t>mean = </a:t>
-            </a:r>
+              <a:t>mean = 0</a:t>
+            </a:r>
+          </a:p>
+          <a:p>
             <a:r>
               <a:rPr lang="en-US" sz="1200" dirty="0" smtClean="0"/>
-              <a:t>0</a:t>
-            </a:r>
-            <a:endParaRPr lang="en-US" sz="1200" dirty="0" smtClean="0"/>
-          </a:p>
-          <a:p>
-            <a:r>
-              <a:rPr lang="en-US" sz="1200" dirty="0" smtClean="0"/>
-              <a:t>variance = </a:t>
-            </a:r>
-            <a:r>
-              <a:rPr lang="en-US" sz="1200" dirty="0" smtClean="0"/>
-              <a:t>1</a:t>
-            </a:r>
-            <a:endParaRPr lang="en-US" sz="1200" dirty="0" smtClean="0"/>
+              <a:t>variance = 1</a:t>
+            </a:r>
           </a:p>
         </p:txBody>
       </p:sp>
@@ -19788,6 +20233,13 @@
   <p:clrMapOvr>
     <a:masterClrMapping/>
   </p:clrMapOvr>
+  <p:timing>
+    <p:tnLst>
+      <p:par>
+        <p:cTn id="1" dur="indefinite" restart="never" nodeType="tmRoot"/>
+      </p:par>
+    </p:tnLst>
+  </p:timing>
 </p:sld>
 </file>
 
@@ -20668,24 +21120,14 @@
           <a:p>
             <a:r>
               <a:rPr lang="en-US" sz="1200" dirty="0" smtClean="0"/>
-              <a:t>mean = </a:t>
-            </a:r>
+              <a:t>mean = 0.443</a:t>
+            </a:r>
+          </a:p>
+          <a:p>
             <a:r>
               <a:rPr lang="en-US" sz="1200" dirty="0" smtClean="0"/>
-              <a:t>0.443</a:t>
-            </a:r>
-            <a:endParaRPr lang="en-US" sz="1200" dirty="0" smtClean="0"/>
-          </a:p>
-          <a:p>
-            <a:r>
-              <a:rPr lang="en-US" sz="1200" dirty="0" smtClean="0"/>
-              <a:t>variance = </a:t>
-            </a:r>
-            <a:r>
-              <a:rPr lang="en-US" sz="1200" dirty="0" smtClean="0"/>
-              <a:t>0.054</a:t>
-            </a:r>
-            <a:endParaRPr lang="en-US" sz="1200" dirty="0" smtClean="0"/>
+              <a:t>variance = 0.054</a:t>
+            </a:r>
           </a:p>
         </p:txBody>
       </p:sp>
@@ -20731,22 +21173,13 @@
           <a:p>
             <a:r>
               <a:rPr lang="en-US" sz="1200" dirty="0" smtClean="0"/>
-              <a:t>mean = </a:t>
-            </a:r>
+              <a:t>mean = 0.443/0.886/1.339/2.719</a:t>
+            </a:r>
+          </a:p>
+          <a:p>
             <a:r>
               <a:rPr lang="en-US" sz="1200" dirty="0" smtClean="0"/>
-              <a:t>0.443/0.886/1.339/2.719</a:t>
-            </a:r>
-            <a:endParaRPr lang="en-US" sz="1200" dirty="0" smtClean="0"/>
-          </a:p>
-          <a:p>
-            <a:r>
-              <a:rPr lang="en-US" sz="1200" dirty="0" smtClean="0"/>
-              <a:t>variance = </a:t>
-            </a:r>
-            <a:r>
-              <a:rPr lang="en-US" sz="1200" dirty="0" smtClean="0"/>
-              <a:t>0.054/0.215/0.237/0.582</a:t>
+              <a:t>variance = 0.054/0.215/0.237/0.582</a:t>
             </a:r>
             <a:endParaRPr lang="en-US" sz="1200" dirty="0"/>
           </a:p>
@@ -20794,22 +21227,13 @@
           <a:p>
             <a:r>
               <a:rPr lang="en-US" sz="1200" dirty="0" smtClean="0"/>
-              <a:t>mean = </a:t>
-            </a:r>
+              <a:t>mean = 2.659/2.679/2.719/2.755</a:t>
+            </a:r>
+          </a:p>
+          <a:p>
             <a:r>
               <a:rPr lang="en-US" sz="1200" dirty="0" smtClean="0"/>
-              <a:t>2.659/2.679/2.719/2.755</a:t>
-            </a:r>
-            <a:endParaRPr lang="en-US" sz="1200" dirty="0" smtClean="0"/>
-          </a:p>
-          <a:p>
-            <a:r>
-              <a:rPr lang="en-US" sz="1200" dirty="0" smtClean="0"/>
-              <a:t>variance = </a:t>
-            </a:r>
-            <a:r>
-              <a:rPr lang="en-US" sz="1200" dirty="0" smtClean="0"/>
-              <a:t>1.931/0.948/0.581/0.398</a:t>
+              <a:t>variance = 1.931/0.948/0.581/0.398</a:t>
             </a:r>
             <a:endParaRPr lang="en-US" sz="1200" dirty="0"/>
           </a:p>
@@ -21401,22 +21825,13 @@
           <a:p>
             <a:r>
               <a:rPr lang="en-US" sz="1200" dirty="0" smtClean="0"/>
-              <a:t>mean = </a:t>
-            </a:r>
+              <a:t>mean = 0.443/0.886/1.329/1.772</a:t>
+            </a:r>
+          </a:p>
+          <a:p>
             <a:r>
               <a:rPr lang="en-US" sz="1200" dirty="0" smtClean="0"/>
-              <a:t>0.443/0.886/1.329/1.772</a:t>
-            </a:r>
-            <a:endParaRPr lang="en-US" sz="1200" dirty="0" smtClean="0"/>
-          </a:p>
-          <a:p>
-            <a:r>
-              <a:rPr lang="en-US" sz="1200" dirty="0" smtClean="0"/>
-              <a:t>variance = </a:t>
-            </a:r>
-            <a:r>
-              <a:rPr lang="en-US" sz="1200" dirty="0" smtClean="0"/>
-              <a:t>0.054/0.215/0.483/0.858</a:t>
+              <a:t>variance = 0.054/0.215/0.483/0.858</a:t>
             </a:r>
             <a:endParaRPr lang="en-US" sz="1200" dirty="0"/>
           </a:p>
@@ -22208,6 +22623,13 @@
   <p:clrMapOvr>
     <a:masterClrMapping/>
   </p:clrMapOvr>
+  <p:timing>
+    <p:tnLst>
+      <p:par>
+        <p:cTn id="1" dur="indefinite" restart="never" nodeType="tmRoot"/>
+      </p:par>
+    </p:tnLst>
+  </p:timing>
 </p:sld>
 </file>
 
@@ -22823,6 +23245,13 @@
   <p:clrMapOvr>
     <a:masterClrMapping/>
   </p:clrMapOvr>
+  <p:timing>
+    <p:tnLst>
+      <p:par>
+        <p:cTn id="1" dur="indefinite" restart="never" nodeType="tmRoot"/>
+      </p:par>
+    </p:tnLst>
+  </p:timing>
 </p:sld>
 </file>
 
@@ -24530,6 +24959,13 @@
   <p:clrMapOvr>
     <a:masterClrMapping/>
   </p:clrMapOvr>
+  <p:timing>
+    <p:tnLst>
+      <p:par>
+        <p:cTn id="1" dur="indefinite" restart="never" nodeType="tmRoot"/>
+      </p:par>
+    </p:tnLst>
+  </p:timing>
 </p:sld>
 </file>
 
@@ -24552,7 +24988,7 @@
       </p:grpSpPr>
       <p:sp>
         <p:nvSpPr>
-          <p:cNvPr id="2" name="Title 1"/>
+          <p:cNvPr id="4" name="Title 3"/>
           <p:cNvSpPr>
             <a:spLocks noGrp="1"/>
           </p:cNvSpPr>
@@ -24562,14 +24998,12 @@
         </p:nvSpPr>
         <p:spPr/>
         <p:txBody>
-          <a:bodyPr>
-            <a:normAutofit fontScale="90000"/>
-          </a:bodyPr>
-          <a:lstStyle/>
-          <a:p>
-            <a:r>
-              <a:rPr lang="en-US" dirty="0" err="1" smtClean="0"/>
-              <a:t>Todo</a:t>
+          <a:bodyPr/>
+          <a:lstStyle/>
+          <a:p>
+            <a:r>
+              <a:rPr lang="en-US" dirty="0" smtClean="0"/>
+              <a:t>Jointly Distributed Random Variable</a:t>
             </a:r>
             <a:endParaRPr lang="en-US" dirty="0"/>
           </a:p>
@@ -24577,12 +25011,12 @@
       </p:sp>
       <p:sp>
         <p:nvSpPr>
-          <p:cNvPr id="3" name="Content Placeholder 2"/>
+          <p:cNvPr id="5" name="Text Placeholder 4"/>
           <p:cNvSpPr>
             <a:spLocks noGrp="1"/>
           </p:cNvSpPr>
           <p:nvPr>
-            <p:ph idx="1"/>
+            <p:ph type="body" idx="1"/>
           </p:nvPr>
         </p:nvSpPr>
         <p:spPr/>
@@ -24590,73 +25024,6 @@
           <a:bodyPr/>
           <a:lstStyle/>
           <a:p>
-            <a:r>
-              <a:rPr lang="zh-TW" altLang="en-US" dirty="0" smtClean="0"/>
-              <a:t>比較</a:t>
-            </a:r>
-            <a:r>
-              <a:rPr lang="en-US" altLang="zh-TW" dirty="0" smtClean="0"/>
-              <a:t>discrete</a:t>
-            </a:r>
-            <a:r>
-              <a:rPr lang="zh-TW" altLang="en-US" dirty="0" smtClean="0"/>
-              <a:t>和</a:t>
-            </a:r>
-            <a:r>
-              <a:rPr lang="en-US" altLang="zh-TW" dirty="0" smtClean="0"/>
-              <a:t>continuous</a:t>
-            </a:r>
-            <a:r>
-              <a:rPr lang="zh-TW" altLang="en-US" dirty="0" smtClean="0"/>
-              <a:t>的</a:t>
-            </a:r>
-            <a:r>
-              <a:rPr lang="en-US" altLang="zh-TW" dirty="0" err="1" smtClean="0"/>
-              <a:t>pmf</a:t>
-            </a:r>
-            <a:r>
-              <a:rPr lang="en-US" altLang="zh-TW" dirty="0" smtClean="0"/>
-              <a:t>/</a:t>
-            </a:r>
-            <a:r>
-              <a:rPr lang="en-US" altLang="zh-TW" dirty="0" err="1" smtClean="0"/>
-              <a:t>pdf</a:t>
-            </a:r>
-            <a:r>
-              <a:rPr lang="zh-TW" altLang="en-US" dirty="0" smtClean="0"/>
-              <a:t>圖</a:t>
-            </a:r>
-            <a:endParaRPr lang="en-US" altLang="zh-TW" dirty="0" smtClean="0"/>
-          </a:p>
-          <a:p>
-            <a:pPr lvl="1"/>
-            <a:r>
-              <a:rPr lang="zh-TW" altLang="en-US" dirty="0" smtClean="0"/>
-              <a:t>機率如果可以，要等價</a:t>
-            </a:r>
-            <a:endParaRPr lang="en-US" altLang="zh-TW" dirty="0" smtClean="0"/>
-          </a:p>
-          <a:p>
-            <a:pPr algn="just"/>
-            <a:r>
-              <a:rPr lang="zh-TW" altLang="en-US" dirty="0" smtClean="0"/>
-              <a:t>溫習</a:t>
-            </a:r>
-            <a:endParaRPr lang="en-US" altLang="zh-TW" dirty="0" smtClean="0"/>
-          </a:p>
-          <a:p>
-            <a:pPr lvl="1" algn="just"/>
-            <a:r>
-              <a:rPr lang="en-US" dirty="0" smtClean="0"/>
-              <a:t>Normal approximation to the Binomial (LNp.6-36)</a:t>
-            </a:r>
-          </a:p>
-          <a:p>
-            <a:pPr lvl="1" algn="just"/>
-            <a:r>
-              <a:rPr lang="en-US" dirty="0" smtClean="0"/>
-              <a:t>Continuity correction</a:t>
-            </a:r>
             <a:endParaRPr lang="en-US" dirty="0"/>
           </a:p>
         </p:txBody>
@@ -24947,6 +25314,13 @@
   <p:clrMapOvr>
     <a:masterClrMapping/>
   </p:clrMapOvr>
+  <p:timing>
+    <p:tnLst>
+      <p:par>
+        <p:cTn id="1" dur="indefinite" restart="never" nodeType="tmRoot"/>
+      </p:par>
+    </p:tnLst>
+  </p:timing>
 </p:sld>
 </file>
 
@@ -25261,6 +25635,13 @@
   <p:clrMapOvr>
     <a:masterClrMapping/>
   </p:clrMapOvr>
+  <p:timing>
+    <p:tnLst>
+      <p:par>
+        <p:cTn id="1" dur="indefinite" restart="never" nodeType="tmRoot"/>
+      </p:par>
+    </p:tnLst>
+  </p:timing>
 </p:sld>
 </file>
 
@@ -25961,6 +26342,188 @@
   <p:clrMapOvr>
     <a:masterClrMapping/>
   </p:clrMapOvr>
+  <p:timing>
+    <p:tnLst>
+      <p:par>
+        <p:cTn id="1" dur="indefinite" restart="never" nodeType="tmRoot"/>
+      </p:par>
+    </p:tnLst>
+  </p:timing>
+</p:sld>
+</file>
+
+<file path=ppt/slides/slide36.xml><?xml version="1.0" encoding="utf-8"?>
+<p:sld xmlns:a="http://schemas.openxmlformats.org/drawingml/2006/main" xmlns:r="http://schemas.openxmlformats.org/officeDocument/2006/relationships" xmlns:p="http://schemas.openxmlformats.org/presentationml/2006/main">
+  <p:cSld>
+    <p:spTree>
+      <p:nvGrpSpPr>
+        <p:cNvPr id="1" name=""/>
+        <p:cNvGrpSpPr/>
+        <p:nvPr/>
+      </p:nvGrpSpPr>
+      <p:grpSpPr>
+        <a:xfrm>
+          <a:off x="0" y="0"/>
+          <a:ext cx="0" cy="0"/>
+          <a:chOff x="0" y="0"/>
+          <a:chExt cx="0" cy="0"/>
+        </a:xfrm>
+      </p:grpSpPr>
+      <p:sp>
+        <p:nvSpPr>
+          <p:cNvPr id="2" name="Title 1"/>
+          <p:cNvSpPr>
+            <a:spLocks noGrp="1"/>
+          </p:cNvSpPr>
+          <p:nvPr>
+            <p:ph type="title"/>
+          </p:nvPr>
+        </p:nvSpPr>
+        <p:spPr/>
+        <p:txBody>
+          <a:bodyPr>
+            <a:normAutofit fontScale="90000"/>
+          </a:bodyPr>
+          <a:lstStyle/>
+          <a:p>
+            <a:r>
+              <a:rPr lang="en-US" dirty="0" smtClean="0"/>
+              <a:t>Convolution</a:t>
+            </a:r>
+            <a:endParaRPr lang="en-US" dirty="0"/>
+          </a:p>
+        </p:txBody>
+      </p:sp>
+      <p:sp>
+        <p:nvSpPr>
+          <p:cNvPr id="3" name="Content Placeholder 2"/>
+          <p:cNvSpPr>
+            <a:spLocks noGrp="1"/>
+          </p:cNvSpPr>
+          <p:nvPr>
+            <p:ph idx="1"/>
+          </p:nvPr>
+        </p:nvSpPr>
+        <p:spPr>
+          <a:xfrm>
+            <a:off x="457200" y="980729"/>
+            <a:ext cx="8229600" cy="1584176"/>
+          </a:xfrm>
+        </p:spPr>
+        <p:txBody>
+          <a:bodyPr>
+            <a:normAutofit fontScale="92500"/>
+          </a:bodyPr>
+          <a:lstStyle/>
+          <a:p>
+            <a:r>
+              <a:rPr lang="en-US" dirty="0" smtClean="0"/>
+              <a:t>The probability distribution of the </a:t>
+            </a:r>
+            <a:r>
+              <a:rPr lang="en-US" dirty="0" smtClean="0">
+                <a:solidFill>
+                  <a:srgbClr val="00B0F0"/>
+                </a:solidFill>
+              </a:rPr>
+              <a:t>sum</a:t>
+            </a:r>
+            <a:r>
+              <a:rPr lang="en-US" dirty="0" smtClean="0"/>
+              <a:t> of two or more </a:t>
+            </a:r>
+            <a:r>
+              <a:rPr lang="en-US" dirty="0" smtClean="0">
+                <a:solidFill>
+                  <a:srgbClr val="FF0000"/>
+                </a:solidFill>
+              </a:rPr>
+              <a:t>independent</a:t>
+            </a:r>
+            <a:r>
+              <a:rPr lang="en-US" dirty="0" smtClean="0"/>
+              <a:t> random variables is the convolution of their individual distributions</a:t>
+            </a:r>
+            <a:endParaRPr lang="en-US" dirty="0"/>
+          </a:p>
+        </p:txBody>
+      </p:sp>
+      <p:pic>
+        <p:nvPicPr>
+          <p:cNvPr id="40962" name="Picture 2"/>
+          <p:cNvPicPr>
+            <a:picLocks noChangeAspect="1" noChangeArrowheads="1"/>
+          </p:cNvPicPr>
+          <p:nvPr/>
+        </p:nvPicPr>
+        <p:blipFill>
+          <a:blip r:embed="rId3" cstate="print"/>
+          <a:srcRect/>
+          <a:stretch>
+            <a:fillRect/>
+          </a:stretch>
+        </p:blipFill>
+        <p:spPr bwMode="auto">
+          <a:xfrm>
+            <a:off x="0" y="2708920"/>
+            <a:ext cx="4464496" cy="1957215"/>
+          </a:xfrm>
+          <a:prstGeom prst="rect">
+            <a:avLst/>
+          </a:prstGeom>
+          <a:noFill/>
+          <a:ln w="9525">
+            <a:noFill/>
+            <a:miter lim="800000"/>
+            <a:headEnd/>
+            <a:tailEnd/>
+          </a:ln>
+        </p:spPr>
+      </p:pic>
+      <p:pic>
+        <p:nvPicPr>
+          <p:cNvPr id="40963" name="Picture 3"/>
+          <p:cNvPicPr>
+            <a:picLocks noChangeAspect="1" noChangeArrowheads="1"/>
+          </p:cNvPicPr>
+          <p:nvPr/>
+        </p:nvPicPr>
+        <p:blipFill>
+          <a:blip r:embed="rId4" cstate="print"/>
+          <a:srcRect/>
+          <a:stretch>
+            <a:fillRect/>
+          </a:stretch>
+        </p:blipFill>
+        <p:spPr bwMode="auto">
+          <a:xfrm>
+            <a:off x="4499992" y="2708920"/>
+            <a:ext cx="4644008" cy="2668380"/>
+          </a:xfrm>
+          <a:prstGeom prst="rect">
+            <a:avLst/>
+          </a:prstGeom>
+          <a:noFill/>
+          <a:ln w="9525">
+            <a:noFill/>
+            <a:miter lim="800000"/>
+            <a:headEnd/>
+            <a:tailEnd/>
+          </a:ln>
+        </p:spPr>
+      </p:pic>
+    </p:spTree>
+  </p:cSld>
+  <p:clrMapOvr>
+    <a:masterClrMapping/>
+  </p:clrMapOvr>
+  <p:timing>
+    <p:tnLst>
+      <p:par>
+        <p:cTn id="1" dur="indefinite" restart="never" nodeType="tmRoot"/>
+      </p:par>
+    </p:tnLst>
+  </p:timing>
 </p:sld>
 </file>
 
@@ -26259,6 +26822,38 @@
           <a:xfrm>
             <a:off x="467544" y="4725144"/>
             <a:ext cx="4686300" cy="1914525"/>
+          </a:xfrm>
+          <a:prstGeom prst="rect">
+            <a:avLst/>
+          </a:prstGeom>
+          <a:noFill/>
+          <a:ln w="9525">
+            <a:noFill/>
+            <a:miter lim="800000"/>
+            <a:headEnd/>
+            <a:tailEnd/>
+          </a:ln>
+        </p:spPr>
+      </p:pic>
+      <p:pic>
+        <p:nvPicPr>
+          <p:cNvPr id="23553" name="Picture 1"/>
+          <p:cNvPicPr>
+            <a:picLocks noChangeAspect="1" noChangeArrowheads="1"/>
+          </p:cNvPicPr>
+          <p:nvPr/>
+        </p:nvPicPr>
+        <p:blipFill>
+          <a:blip r:embed="rId3" cstate="print"/>
+          <a:srcRect/>
+          <a:stretch>
+            <a:fillRect/>
+          </a:stretch>
+        </p:blipFill>
+        <p:spPr bwMode="auto">
+          <a:xfrm>
+            <a:off x="4211960" y="6093296"/>
+            <a:ext cx="4578449" cy="536138"/>
           </a:xfrm>
           <a:prstGeom prst="rect">
             <a:avLst/>
@@ -27115,7 +27710,7 @@
             </a:r>
             <a:r>
               <a:rPr lang="en-US" altLang="zh-TW" dirty="0" smtClean="0"/>
-              <a:t>r</a:t>
+              <a:t>size</a:t>
             </a:r>
             <a:r>
               <a:rPr lang="zh-TW" altLang="en-US" dirty="0" smtClean="0"/>
@@ -27380,6 +27975,38 @@
           <a:xfrm>
             <a:off x="467544" y="4653136"/>
             <a:ext cx="4829175" cy="1704975"/>
+          </a:xfrm>
+          <a:prstGeom prst="rect">
+            <a:avLst/>
+          </a:prstGeom>
+          <a:noFill/>
+          <a:ln w="9525">
+            <a:noFill/>
+            <a:miter lim="800000"/>
+            <a:headEnd/>
+            <a:tailEnd/>
+          </a:ln>
+        </p:spPr>
+      </p:pic>
+      <p:pic>
+        <p:nvPicPr>
+          <p:cNvPr id="21505" name="Picture 1"/>
+          <p:cNvPicPr>
+            <a:picLocks noChangeAspect="1" noChangeArrowheads="1"/>
+          </p:cNvPicPr>
+          <p:nvPr/>
+        </p:nvPicPr>
+        <p:blipFill>
+          <a:blip r:embed="rId3" cstate="print"/>
+          <a:srcRect/>
+          <a:stretch>
+            <a:fillRect/>
+          </a:stretch>
+        </p:blipFill>
+        <p:spPr bwMode="auto">
+          <a:xfrm>
+            <a:off x="4067944" y="6021288"/>
+            <a:ext cx="4932040" cy="730013"/>
           </a:xfrm>
           <a:prstGeom prst="rect">
             <a:avLst/>
@@ -27568,7 +28195,7 @@
           <a:p>
             <a:r>
               <a:rPr lang="en-US" sz="1200" dirty="0" smtClean="0"/>
-              <a:t>x = {1, 2, .., 10}</a:t>
+              <a:t>x = {1, 2, .., 25}</a:t>
             </a:r>
           </a:p>
           <a:p>
@@ -29332,4 +29959,287 @@
   <a:objectDefaults/>
   <a:extraClrSchemeLst/>
 </a:theme>
+</file>
+
+<file path=ppt/theme/theme2.xml><?xml version="1.0" encoding="utf-8"?>
+<a:theme xmlns:a="http://schemas.openxmlformats.org/drawingml/2006/main" name="Office Theme">
+  <a:themeElements>
+    <a:clrScheme name="Office">
+      <a:dk1>
+        <a:sysClr val="windowText" lastClr="000000"/>
+      </a:dk1>
+      <a:lt1>
+        <a:sysClr val="window" lastClr="FFFFFF"/>
+      </a:lt1>
+      <a:dk2>
+        <a:srgbClr val="1F497D"/>
+      </a:dk2>
+      <a:lt2>
+        <a:srgbClr val="EEECE1"/>
+      </a:lt2>
+      <a:accent1>
+        <a:srgbClr val="4F81BD"/>
+      </a:accent1>
+      <a:accent2>
+        <a:srgbClr val="C0504D"/>
+      </a:accent2>
+      <a:accent3>
+        <a:srgbClr val="9BBB59"/>
+      </a:accent3>
+      <a:accent4>
+        <a:srgbClr val="8064A2"/>
+      </a:accent4>
+      <a:accent5>
+        <a:srgbClr val="4BACC6"/>
+      </a:accent5>
+      <a:accent6>
+        <a:srgbClr val="F79646"/>
+      </a:accent6>
+      <a:hlink>
+        <a:srgbClr val="0000FF"/>
+      </a:hlink>
+      <a:folHlink>
+        <a:srgbClr val="800080"/>
+      </a:folHlink>
+    </a:clrScheme>
+    <a:fontScheme name="Office">
+      <a:majorFont>
+        <a:latin typeface="Calibri"/>
+        <a:ea typeface=""/>
+        <a:cs typeface=""/>
+        <a:font script="Jpan" typeface="ＭＳ Ｐゴシック"/>
+        <a:font script="Hang" typeface="맑은 고딕"/>
+        <a:font script="Hans" typeface="宋体"/>
+        <a:font script="Hant" typeface="新細明體"/>
+        <a:font script="Arab" typeface="Times New Roman"/>
+        <a:font script="Hebr" typeface="Times New Roman"/>
+        <a:font script="Thai" typeface="Angsana New"/>
+        <a:font script="Ethi" typeface="Nyala"/>
+        <a:font script="Beng" typeface="Vrinda"/>
+        <a:font script="Gujr" typeface="Shruti"/>
+        <a:font script="Khmr" typeface="MoolBoran"/>
+        <a:font script="Knda" typeface="Tunga"/>
+        <a:font script="Guru" typeface="Raavi"/>
+        <a:font script="Cans" typeface="Euphemia"/>
+        <a:font script="Cher" typeface="Plantagenet Cherokee"/>
+        <a:font script="Yiii" typeface="Microsoft Yi Baiti"/>
+        <a:font script="Tibt" typeface="Microsoft Himalaya"/>
+        <a:font script="Thaa" typeface="MV Boli"/>
+        <a:font script="Deva" typeface="Mangal"/>
+        <a:font script="Telu" typeface="Gautami"/>
+        <a:font script="Taml" typeface="Latha"/>
+        <a:font script="Syrc" typeface="Estrangelo Edessa"/>
+        <a:font script="Orya" typeface="Kalinga"/>
+        <a:font script="Mlym" typeface="Kartika"/>
+        <a:font script="Laoo" typeface="DokChampa"/>
+        <a:font script="Sinh" typeface="Iskoola Pota"/>
+        <a:font script="Mong" typeface="Mongolian Baiti"/>
+        <a:font script="Viet" typeface="Times New Roman"/>
+        <a:font script="Uigh" typeface="Microsoft Uighur"/>
+      </a:majorFont>
+      <a:minorFont>
+        <a:latin typeface="Calibri"/>
+        <a:ea typeface=""/>
+        <a:cs typeface=""/>
+        <a:font script="Jpan" typeface="ＭＳ Ｐゴシック"/>
+        <a:font script="Hang" typeface="맑은 고딕"/>
+        <a:font script="Hans" typeface="宋体"/>
+        <a:font script="Hant" typeface="新細明體"/>
+        <a:font script="Arab" typeface="Arial"/>
+        <a:font script="Hebr" typeface="Arial"/>
+        <a:font script="Thai" typeface="Cordia New"/>
+        <a:font script="Ethi" typeface="Nyala"/>
+        <a:font script="Beng" typeface="Vrinda"/>
+        <a:font script="Gujr" typeface="Shruti"/>
+        <a:font script="Khmr" typeface="DaunPenh"/>
+        <a:font script="Knda" typeface="Tunga"/>
+        <a:font script="Guru" typeface="Raavi"/>
+        <a:font script="Cans" typeface="Euphemia"/>
+        <a:font script="Cher" typeface="Plantagenet Cherokee"/>
+        <a:font script="Yiii" typeface="Microsoft Yi Baiti"/>
+        <a:font script="Tibt" typeface="Microsoft Himalaya"/>
+        <a:font script="Thaa" typeface="MV Boli"/>
+        <a:font script="Deva" typeface="Mangal"/>
+        <a:font script="Telu" typeface="Gautami"/>
+        <a:font script="Taml" typeface="Latha"/>
+        <a:font script="Syrc" typeface="Estrangelo Edessa"/>
+        <a:font script="Orya" typeface="Kalinga"/>
+        <a:font script="Mlym" typeface="Kartika"/>
+        <a:font script="Laoo" typeface="DokChampa"/>
+        <a:font script="Sinh" typeface="Iskoola Pota"/>
+        <a:font script="Mong" typeface="Mongolian Baiti"/>
+        <a:font script="Viet" typeface="Arial"/>
+        <a:font script="Uigh" typeface="Microsoft Uighur"/>
+      </a:minorFont>
+    </a:fontScheme>
+    <a:fmtScheme name="Office">
+      <a:fillStyleLst>
+        <a:solidFill>
+          <a:schemeClr val="phClr"/>
+        </a:solidFill>
+        <a:gradFill rotWithShape="1">
+          <a:gsLst>
+            <a:gs pos="0">
+              <a:schemeClr val="phClr">
+                <a:tint val="50000"/>
+                <a:satMod val="300000"/>
+              </a:schemeClr>
+            </a:gs>
+            <a:gs pos="35000">
+              <a:schemeClr val="phClr">
+                <a:tint val="37000"/>
+                <a:satMod val="300000"/>
+              </a:schemeClr>
+            </a:gs>
+            <a:gs pos="100000">
+              <a:schemeClr val="phClr">
+                <a:tint val="15000"/>
+                <a:satMod val="350000"/>
+              </a:schemeClr>
+            </a:gs>
+          </a:gsLst>
+          <a:lin ang="16200000" scaled="1"/>
+        </a:gradFill>
+        <a:gradFill rotWithShape="1">
+          <a:gsLst>
+            <a:gs pos="0">
+              <a:schemeClr val="phClr">
+                <a:shade val="51000"/>
+                <a:satMod val="130000"/>
+              </a:schemeClr>
+            </a:gs>
+            <a:gs pos="80000">
+              <a:schemeClr val="phClr">
+                <a:shade val="93000"/>
+                <a:satMod val="130000"/>
+              </a:schemeClr>
+            </a:gs>
+            <a:gs pos="100000">
+              <a:schemeClr val="phClr">
+                <a:shade val="94000"/>
+                <a:satMod val="135000"/>
+              </a:schemeClr>
+            </a:gs>
+          </a:gsLst>
+          <a:lin ang="16200000" scaled="0"/>
+        </a:gradFill>
+      </a:fillStyleLst>
+      <a:lnStyleLst>
+        <a:ln w="9525" cap="flat" cmpd="sng" algn="ctr">
+          <a:solidFill>
+            <a:schemeClr val="phClr">
+              <a:shade val="95000"/>
+              <a:satMod val="105000"/>
+            </a:schemeClr>
+          </a:solidFill>
+          <a:prstDash val="solid"/>
+        </a:ln>
+        <a:ln w="25400" cap="flat" cmpd="sng" algn="ctr">
+          <a:solidFill>
+            <a:schemeClr val="phClr"/>
+          </a:solidFill>
+          <a:prstDash val="solid"/>
+        </a:ln>
+        <a:ln w="38100" cap="flat" cmpd="sng" algn="ctr">
+          <a:solidFill>
+            <a:schemeClr val="phClr"/>
+          </a:solidFill>
+          <a:prstDash val="solid"/>
+        </a:ln>
+      </a:lnStyleLst>
+      <a:effectStyleLst>
+        <a:effectStyle>
+          <a:effectLst>
+            <a:outerShdw blurRad="40000" dist="20000" dir="5400000" rotWithShape="0">
+              <a:srgbClr val="000000">
+                <a:alpha val="38000"/>
+              </a:srgbClr>
+            </a:outerShdw>
+          </a:effectLst>
+        </a:effectStyle>
+        <a:effectStyle>
+          <a:effectLst>
+            <a:outerShdw blurRad="40000" dist="23000" dir="5400000" rotWithShape="0">
+              <a:srgbClr val="000000">
+                <a:alpha val="35000"/>
+              </a:srgbClr>
+            </a:outerShdw>
+          </a:effectLst>
+        </a:effectStyle>
+        <a:effectStyle>
+          <a:effectLst>
+            <a:outerShdw blurRad="40000" dist="23000" dir="5400000" rotWithShape="0">
+              <a:srgbClr val="000000">
+                <a:alpha val="35000"/>
+              </a:srgbClr>
+            </a:outerShdw>
+          </a:effectLst>
+          <a:scene3d>
+            <a:camera prst="orthographicFront">
+              <a:rot lat="0" lon="0" rev="0"/>
+            </a:camera>
+            <a:lightRig rig="threePt" dir="t">
+              <a:rot lat="0" lon="0" rev="1200000"/>
+            </a:lightRig>
+          </a:scene3d>
+          <a:sp3d>
+            <a:bevelT w="63500" h="25400"/>
+          </a:sp3d>
+        </a:effectStyle>
+      </a:effectStyleLst>
+      <a:bgFillStyleLst>
+        <a:solidFill>
+          <a:schemeClr val="phClr"/>
+        </a:solidFill>
+        <a:gradFill rotWithShape="1">
+          <a:gsLst>
+            <a:gs pos="0">
+              <a:schemeClr val="phClr">
+                <a:tint val="40000"/>
+                <a:satMod val="350000"/>
+              </a:schemeClr>
+            </a:gs>
+            <a:gs pos="40000">
+              <a:schemeClr val="phClr">
+                <a:tint val="45000"/>
+                <a:shade val="99000"/>
+                <a:satMod val="350000"/>
+              </a:schemeClr>
+            </a:gs>
+            <a:gs pos="100000">
+              <a:schemeClr val="phClr">
+                <a:shade val="20000"/>
+                <a:satMod val="255000"/>
+              </a:schemeClr>
+            </a:gs>
+          </a:gsLst>
+          <a:path path="circle">
+            <a:fillToRect l="50000" t="-80000" r="50000" b="180000"/>
+          </a:path>
+        </a:gradFill>
+        <a:gradFill rotWithShape="1">
+          <a:gsLst>
+            <a:gs pos="0">
+              <a:schemeClr val="phClr">
+                <a:tint val="80000"/>
+                <a:satMod val="300000"/>
+              </a:schemeClr>
+            </a:gs>
+            <a:gs pos="100000">
+              <a:schemeClr val="phClr">
+                <a:shade val="30000"/>
+                <a:satMod val="200000"/>
+              </a:schemeClr>
+            </a:gs>
+          </a:gsLst>
+          <a:path path="circle">
+            <a:fillToRect l="50000" t="50000" r="50000" b="50000"/>
+          </a:path>
+        </a:gradFill>
+      </a:bgFillStyleLst>
+    </a:fmtScheme>
+  </a:themeElements>
+  <a:objectDefaults/>
+  <a:extraClrSchemeLst/>
+</a:theme>
 </file>
</xml_diff>